<commit_message>
Update PowerPoint report with new design and insights
</commit_message>
<xml_diff>
--- a/EV_Report.pptx
+++ b/EV_Report.pptx
@@ -5,11 +5,13 @@
     <p:sldMasterId id="2147483648" r:id="rId1"/>
   </p:sldMasterIdLst>
   <p:sldIdLst>
-    <p:sldId id="256" r:id="rId7"/>
-    <p:sldId id="257" r:id="rId8"/>
-    <p:sldId id="258" r:id="rId9"/>
-    <p:sldId id="259" r:id="rId10"/>
-    <p:sldId id="260" r:id="rId11"/>
+    <p:sldId id="256" r:id="rId2"/>
+    <p:sldId id="261" r:id="rId3"/>
+    <p:sldId id="257" r:id="rId4"/>
+    <p:sldId id="258" r:id="rId5"/>
+    <p:sldId id="259" r:id="rId6"/>
+    <p:sldId id="260" r:id="rId7"/>
+    <p:sldId id="262" r:id="rId8"/>
   </p:sldIdLst>
   <p:sldSz cx="9144000" cy="6858000" type="screen4x3"/>
   <p:notesSz cx="6858000" cy="9144000"/>
@@ -108,6 +110,22 @@
       </a:defRPr>
     </a:lvl9pPr>
   </p:defaultTextStyle>
+  <p:extLst>
+    <p:ext uri="{EFAFB233-063F-42B5-8137-9DF3F51BA10A}">
+      <p15:sldGuideLst xmlns:p15="http://schemas.microsoft.com/office/powerpoint/2012/main">
+        <p15:guide id="1" orient="horz" pos="2160">
+          <p15:clr>
+            <a:srgbClr val="A4A3A4"/>
+          </p15:clr>
+        </p15:guide>
+        <p15:guide id="2" pos="2880">
+          <p15:clr>
+            <a:srgbClr val="A4A3A4"/>
+          </p15:clr>
+        </p15:guide>
+      </p15:sldGuideLst>
+    </p:ext>
+  </p:extLst>
 </p:presentation>
 </file>
 
@@ -149,10 +167,9 @@
           <a:lstStyle/>
           <a:p>
             <a:r>
-              <a:rPr lang="en-US" smtClean="0"/>
+              <a:rPr lang="en-US"/>
               <a:t>Click to edit Master title style</a:t>
             </a:r>
-            <a:endParaRPr lang="en-US"/>
           </a:p>
         </p:txBody>
       </p:sp>
@@ -268,10 +285,9 @@
           </a:lstStyle>
           <a:p>
             <a:r>
-              <a:rPr lang="en-US" smtClean="0"/>
+              <a:rPr lang="en-US"/>
               <a:t>Click to edit Master subtitle style</a:t>
             </a:r>
-            <a:endParaRPr lang="en-US"/>
           </a:p>
         </p:txBody>
       </p:sp>
@@ -292,7 +308,7 @@
           <a:p>
             <a:fld id="{5BCAD085-E8A6-8845-BD4E-CB4CCA059FC4}" type="datetimeFigureOut">
               <a:rPr lang="en-US" smtClean="0"/>
-              <a:t>1/27/13</a:t>
+              <a:t>9/3/2025</a:t>
             </a:fld>
             <a:endParaRPr lang="en-US"/>
           </a:p>
@@ -386,10 +402,9 @@
           <a:lstStyle/>
           <a:p>
             <a:r>
-              <a:rPr lang="en-US" smtClean="0"/>
+              <a:rPr lang="en-US"/>
               <a:t>Click to edit Master title style</a:t>
             </a:r>
-            <a:endParaRPr lang="en-US"/>
           </a:p>
         </p:txBody>
       </p:sp>
@@ -410,38 +425,37 @@
           <a:p>
             <a:pPr lvl="0"/>
             <a:r>
-              <a:rPr lang="en-US" smtClean="0"/>
+              <a:rPr lang="en-US"/>
               <a:t>Click to edit Master text styles</a:t>
             </a:r>
           </a:p>
           <a:p>
             <a:pPr lvl="1"/>
             <a:r>
-              <a:rPr lang="en-US" smtClean="0"/>
+              <a:rPr lang="en-US"/>
               <a:t>Second level</a:t>
             </a:r>
           </a:p>
           <a:p>
             <a:pPr lvl="2"/>
             <a:r>
-              <a:rPr lang="en-US" smtClean="0"/>
+              <a:rPr lang="en-US"/>
               <a:t>Third level</a:t>
             </a:r>
           </a:p>
           <a:p>
             <a:pPr lvl="3"/>
             <a:r>
-              <a:rPr lang="en-US" smtClean="0"/>
+              <a:rPr lang="en-US"/>
               <a:t>Fourth level</a:t>
             </a:r>
           </a:p>
           <a:p>
             <a:pPr lvl="4"/>
             <a:r>
-              <a:rPr lang="en-US" smtClean="0"/>
+              <a:rPr lang="en-US"/>
               <a:t>Fifth level</a:t>
             </a:r>
-            <a:endParaRPr lang="en-US"/>
           </a:p>
         </p:txBody>
       </p:sp>
@@ -462,7 +476,7 @@
           <a:p>
             <a:fld id="{5BCAD085-E8A6-8845-BD4E-CB4CCA059FC4}" type="datetimeFigureOut">
               <a:rPr lang="en-US" smtClean="0"/>
-              <a:t>1/27/13</a:t>
+              <a:t>9/3/2025</a:t>
             </a:fld>
             <a:endParaRPr lang="en-US"/>
           </a:p>
@@ -561,10 +575,9 @@
           <a:lstStyle/>
           <a:p>
             <a:r>
-              <a:rPr lang="en-US" smtClean="0"/>
+              <a:rPr lang="en-US"/>
               <a:t>Click to edit Master title style</a:t>
             </a:r>
-            <a:endParaRPr lang="en-US"/>
           </a:p>
         </p:txBody>
       </p:sp>
@@ -590,38 +603,37 @@
           <a:p>
             <a:pPr lvl="0"/>
             <a:r>
-              <a:rPr lang="en-US" smtClean="0"/>
+              <a:rPr lang="en-US"/>
               <a:t>Click to edit Master text styles</a:t>
             </a:r>
           </a:p>
           <a:p>
             <a:pPr lvl="1"/>
             <a:r>
-              <a:rPr lang="en-US" smtClean="0"/>
+              <a:rPr lang="en-US"/>
               <a:t>Second level</a:t>
             </a:r>
           </a:p>
           <a:p>
             <a:pPr lvl="2"/>
             <a:r>
-              <a:rPr lang="en-US" smtClean="0"/>
+              <a:rPr lang="en-US"/>
               <a:t>Third level</a:t>
             </a:r>
           </a:p>
           <a:p>
             <a:pPr lvl="3"/>
             <a:r>
-              <a:rPr lang="en-US" smtClean="0"/>
+              <a:rPr lang="en-US"/>
               <a:t>Fourth level</a:t>
             </a:r>
           </a:p>
           <a:p>
             <a:pPr lvl="4"/>
             <a:r>
-              <a:rPr lang="en-US" smtClean="0"/>
+              <a:rPr lang="en-US"/>
               <a:t>Fifth level</a:t>
             </a:r>
-            <a:endParaRPr lang="en-US"/>
           </a:p>
         </p:txBody>
       </p:sp>
@@ -642,7 +654,7 @@
           <a:p>
             <a:fld id="{5BCAD085-E8A6-8845-BD4E-CB4CCA059FC4}" type="datetimeFigureOut">
               <a:rPr lang="en-US" smtClean="0"/>
-              <a:t>1/27/13</a:t>
+              <a:t>9/3/2025</a:t>
             </a:fld>
             <a:endParaRPr lang="en-US"/>
           </a:p>
@@ -736,10 +748,9 @@
           <a:lstStyle/>
           <a:p>
             <a:r>
-              <a:rPr lang="en-US" smtClean="0"/>
+              <a:rPr lang="en-US"/>
               <a:t>Click to edit Master title style</a:t>
             </a:r>
-            <a:endParaRPr lang="en-US"/>
           </a:p>
         </p:txBody>
       </p:sp>
@@ -760,38 +771,37 @@
           <a:p>
             <a:pPr lvl="0"/>
             <a:r>
-              <a:rPr lang="en-US" smtClean="0"/>
+              <a:rPr lang="en-US"/>
               <a:t>Click to edit Master text styles</a:t>
             </a:r>
           </a:p>
           <a:p>
             <a:pPr lvl="1"/>
             <a:r>
-              <a:rPr lang="en-US" smtClean="0"/>
+              <a:rPr lang="en-US"/>
               <a:t>Second level</a:t>
             </a:r>
           </a:p>
           <a:p>
             <a:pPr lvl="2"/>
             <a:r>
-              <a:rPr lang="en-US" smtClean="0"/>
+              <a:rPr lang="en-US"/>
               <a:t>Third level</a:t>
             </a:r>
           </a:p>
           <a:p>
             <a:pPr lvl="3"/>
             <a:r>
-              <a:rPr lang="en-US" smtClean="0"/>
+              <a:rPr lang="en-US"/>
               <a:t>Fourth level</a:t>
             </a:r>
           </a:p>
           <a:p>
             <a:pPr lvl="4"/>
             <a:r>
-              <a:rPr lang="en-US" smtClean="0"/>
+              <a:rPr lang="en-US"/>
               <a:t>Fifth level</a:t>
             </a:r>
-            <a:endParaRPr lang="en-US"/>
           </a:p>
         </p:txBody>
       </p:sp>
@@ -812,7 +822,7 @@
           <a:p>
             <a:fld id="{5BCAD085-E8A6-8845-BD4E-CB4CCA059FC4}" type="datetimeFigureOut">
               <a:rPr lang="en-US" smtClean="0"/>
-              <a:t>1/27/13</a:t>
+              <a:t>9/3/2025</a:t>
             </a:fld>
             <a:endParaRPr lang="en-US"/>
           </a:p>
@@ -915,10 +925,9 @@
           </a:lstStyle>
           <a:p>
             <a:r>
-              <a:rPr lang="en-US" smtClean="0"/>
+              <a:rPr lang="en-US"/>
               <a:t>Click to edit Master title style</a:t>
             </a:r>
-            <a:endParaRPr lang="en-US"/>
           </a:p>
         </p:txBody>
       </p:sp>
@@ -1035,7 +1044,7 @@
           <a:p>
             <a:pPr lvl="0"/>
             <a:r>
-              <a:rPr lang="en-US" smtClean="0"/>
+              <a:rPr lang="en-US"/>
               <a:t>Click to edit Master text styles</a:t>
             </a:r>
           </a:p>
@@ -1058,7 +1067,7 @@
           <a:p>
             <a:fld id="{5BCAD085-E8A6-8845-BD4E-CB4CCA059FC4}" type="datetimeFigureOut">
               <a:rPr lang="en-US" smtClean="0"/>
-              <a:t>1/27/13</a:t>
+              <a:t>9/3/2025</a:t>
             </a:fld>
             <a:endParaRPr lang="en-US"/>
           </a:p>
@@ -1152,10 +1161,9 @@
           <a:lstStyle/>
           <a:p>
             <a:r>
-              <a:rPr lang="en-US" smtClean="0"/>
+              <a:rPr lang="en-US"/>
               <a:t>Click to edit Master title style</a:t>
             </a:r>
-            <a:endParaRPr lang="en-US"/>
           </a:p>
         </p:txBody>
       </p:sp>
@@ -1209,38 +1217,37 @@
           <a:p>
             <a:pPr lvl="0"/>
             <a:r>
-              <a:rPr lang="en-US" smtClean="0"/>
+              <a:rPr lang="en-US"/>
               <a:t>Click to edit Master text styles</a:t>
             </a:r>
           </a:p>
           <a:p>
             <a:pPr lvl="1"/>
             <a:r>
-              <a:rPr lang="en-US" smtClean="0"/>
+              <a:rPr lang="en-US"/>
               <a:t>Second level</a:t>
             </a:r>
           </a:p>
           <a:p>
             <a:pPr lvl="2"/>
             <a:r>
-              <a:rPr lang="en-US" smtClean="0"/>
+              <a:rPr lang="en-US"/>
               <a:t>Third level</a:t>
             </a:r>
           </a:p>
           <a:p>
             <a:pPr lvl="3"/>
             <a:r>
-              <a:rPr lang="en-US" smtClean="0"/>
+              <a:rPr lang="en-US"/>
               <a:t>Fourth level</a:t>
             </a:r>
           </a:p>
           <a:p>
             <a:pPr lvl="4"/>
             <a:r>
-              <a:rPr lang="en-US" smtClean="0"/>
+              <a:rPr lang="en-US"/>
               <a:t>Fifth level</a:t>
             </a:r>
-            <a:endParaRPr lang="en-US"/>
           </a:p>
         </p:txBody>
       </p:sp>
@@ -1294,38 +1301,37 @@
           <a:p>
             <a:pPr lvl="0"/>
             <a:r>
-              <a:rPr lang="en-US" smtClean="0"/>
+              <a:rPr lang="en-US"/>
               <a:t>Click to edit Master text styles</a:t>
             </a:r>
           </a:p>
           <a:p>
             <a:pPr lvl="1"/>
             <a:r>
-              <a:rPr lang="en-US" smtClean="0"/>
+              <a:rPr lang="en-US"/>
               <a:t>Second level</a:t>
             </a:r>
           </a:p>
           <a:p>
             <a:pPr lvl="2"/>
             <a:r>
-              <a:rPr lang="en-US" smtClean="0"/>
+              <a:rPr lang="en-US"/>
               <a:t>Third level</a:t>
             </a:r>
           </a:p>
           <a:p>
             <a:pPr lvl="3"/>
             <a:r>
-              <a:rPr lang="en-US" smtClean="0"/>
+              <a:rPr lang="en-US"/>
               <a:t>Fourth level</a:t>
             </a:r>
           </a:p>
           <a:p>
             <a:pPr lvl="4"/>
             <a:r>
-              <a:rPr lang="en-US" smtClean="0"/>
+              <a:rPr lang="en-US"/>
               <a:t>Fifth level</a:t>
             </a:r>
-            <a:endParaRPr lang="en-US"/>
           </a:p>
         </p:txBody>
       </p:sp>
@@ -1346,7 +1352,7 @@
           <a:p>
             <a:fld id="{5BCAD085-E8A6-8845-BD4E-CB4CCA059FC4}" type="datetimeFigureOut">
               <a:rPr lang="en-US" smtClean="0"/>
-              <a:t>1/27/13</a:t>
+              <a:t>9/3/2025</a:t>
             </a:fld>
             <a:endParaRPr lang="en-US"/>
           </a:p>
@@ -1444,10 +1450,9 @@
           </a:lstStyle>
           <a:p>
             <a:r>
-              <a:rPr lang="en-US" smtClean="0"/>
+              <a:rPr lang="en-US"/>
               <a:t>Click to edit Master title style</a:t>
             </a:r>
-            <a:endParaRPr lang="en-US"/>
           </a:p>
         </p:txBody>
       </p:sp>
@@ -1510,7 +1515,7 @@
           <a:p>
             <a:pPr lvl="0"/>
             <a:r>
-              <a:rPr lang="en-US" smtClean="0"/>
+              <a:rPr lang="en-US"/>
               <a:t>Click to edit Master text styles</a:t>
             </a:r>
           </a:p>
@@ -1566,38 +1571,37 @@
           <a:p>
             <a:pPr lvl="0"/>
             <a:r>
-              <a:rPr lang="en-US" smtClean="0"/>
+              <a:rPr lang="en-US"/>
               <a:t>Click to edit Master text styles</a:t>
             </a:r>
           </a:p>
           <a:p>
             <a:pPr lvl="1"/>
             <a:r>
-              <a:rPr lang="en-US" smtClean="0"/>
+              <a:rPr lang="en-US"/>
               <a:t>Second level</a:t>
             </a:r>
           </a:p>
           <a:p>
             <a:pPr lvl="2"/>
             <a:r>
-              <a:rPr lang="en-US" smtClean="0"/>
+              <a:rPr lang="en-US"/>
               <a:t>Third level</a:t>
             </a:r>
           </a:p>
           <a:p>
             <a:pPr lvl="3"/>
             <a:r>
-              <a:rPr lang="en-US" smtClean="0"/>
+              <a:rPr lang="en-US"/>
               <a:t>Fourth level</a:t>
             </a:r>
           </a:p>
           <a:p>
             <a:pPr lvl="4"/>
             <a:r>
-              <a:rPr lang="en-US" smtClean="0"/>
+              <a:rPr lang="en-US"/>
               <a:t>Fifth level</a:t>
             </a:r>
-            <a:endParaRPr lang="en-US"/>
           </a:p>
         </p:txBody>
       </p:sp>
@@ -1660,7 +1664,7 @@
           <a:p>
             <a:pPr lvl="0"/>
             <a:r>
-              <a:rPr lang="en-US" smtClean="0"/>
+              <a:rPr lang="en-US"/>
               <a:t>Click to edit Master text styles</a:t>
             </a:r>
           </a:p>
@@ -1716,38 +1720,37 @@
           <a:p>
             <a:pPr lvl="0"/>
             <a:r>
-              <a:rPr lang="en-US" smtClean="0"/>
+              <a:rPr lang="en-US"/>
               <a:t>Click to edit Master text styles</a:t>
             </a:r>
           </a:p>
           <a:p>
             <a:pPr lvl="1"/>
             <a:r>
-              <a:rPr lang="en-US" smtClean="0"/>
+              <a:rPr lang="en-US"/>
               <a:t>Second level</a:t>
             </a:r>
           </a:p>
           <a:p>
             <a:pPr lvl="2"/>
             <a:r>
-              <a:rPr lang="en-US" smtClean="0"/>
+              <a:rPr lang="en-US"/>
               <a:t>Third level</a:t>
             </a:r>
           </a:p>
           <a:p>
             <a:pPr lvl="3"/>
             <a:r>
-              <a:rPr lang="en-US" smtClean="0"/>
+              <a:rPr lang="en-US"/>
               <a:t>Fourth level</a:t>
             </a:r>
           </a:p>
           <a:p>
             <a:pPr lvl="4"/>
             <a:r>
-              <a:rPr lang="en-US" smtClean="0"/>
+              <a:rPr lang="en-US"/>
               <a:t>Fifth level</a:t>
             </a:r>
-            <a:endParaRPr lang="en-US"/>
           </a:p>
         </p:txBody>
       </p:sp>
@@ -1768,7 +1771,7 @@
           <a:p>
             <a:fld id="{5BCAD085-E8A6-8845-BD4E-CB4CCA059FC4}" type="datetimeFigureOut">
               <a:rPr lang="en-US" smtClean="0"/>
-              <a:t>1/27/13</a:t>
+              <a:t>9/3/2025</a:t>
             </a:fld>
             <a:endParaRPr lang="en-US"/>
           </a:p>
@@ -1862,10 +1865,9 @@
           <a:lstStyle/>
           <a:p>
             <a:r>
-              <a:rPr lang="en-US" smtClean="0"/>
+              <a:rPr lang="en-US"/>
               <a:t>Click to edit Master title style</a:t>
             </a:r>
-            <a:endParaRPr lang="en-US"/>
           </a:p>
         </p:txBody>
       </p:sp>
@@ -1886,7 +1888,7 @@
           <a:p>
             <a:fld id="{5BCAD085-E8A6-8845-BD4E-CB4CCA059FC4}" type="datetimeFigureOut">
               <a:rPr lang="en-US" smtClean="0"/>
-              <a:t>1/27/13</a:t>
+              <a:t>9/3/2025</a:t>
             </a:fld>
             <a:endParaRPr lang="en-US"/>
           </a:p>
@@ -1981,7 +1983,7 @@
           <a:p>
             <a:fld id="{5BCAD085-E8A6-8845-BD4E-CB4CCA059FC4}" type="datetimeFigureOut">
               <a:rPr lang="en-US" smtClean="0"/>
-              <a:t>1/27/13</a:t>
+              <a:t>9/3/2025</a:t>
             </a:fld>
             <a:endParaRPr lang="en-US"/>
           </a:p>
@@ -2084,10 +2086,9 @@
           </a:lstStyle>
           <a:p>
             <a:r>
-              <a:rPr lang="en-US" smtClean="0"/>
+              <a:rPr lang="en-US"/>
               <a:t>Click to edit Master title style</a:t>
             </a:r>
-            <a:endParaRPr lang="en-US"/>
           </a:p>
         </p:txBody>
       </p:sp>
@@ -2141,38 +2142,37 @@
           <a:p>
             <a:pPr lvl="0"/>
             <a:r>
-              <a:rPr lang="en-US" smtClean="0"/>
+              <a:rPr lang="en-US"/>
               <a:t>Click to edit Master text styles</a:t>
             </a:r>
           </a:p>
           <a:p>
             <a:pPr lvl="1"/>
             <a:r>
-              <a:rPr lang="en-US" smtClean="0"/>
+              <a:rPr lang="en-US"/>
               <a:t>Second level</a:t>
             </a:r>
           </a:p>
           <a:p>
             <a:pPr lvl="2"/>
             <a:r>
-              <a:rPr lang="en-US" smtClean="0"/>
+              <a:rPr lang="en-US"/>
               <a:t>Third level</a:t>
             </a:r>
           </a:p>
           <a:p>
             <a:pPr lvl="3"/>
             <a:r>
-              <a:rPr lang="en-US" smtClean="0"/>
+              <a:rPr lang="en-US"/>
               <a:t>Fourth level</a:t>
             </a:r>
           </a:p>
           <a:p>
             <a:pPr lvl="4"/>
             <a:r>
-              <a:rPr lang="en-US" smtClean="0"/>
+              <a:rPr lang="en-US"/>
               <a:t>Fifth level</a:t>
             </a:r>
-            <a:endParaRPr lang="en-US"/>
           </a:p>
         </p:txBody>
       </p:sp>
@@ -2235,7 +2235,7 @@
           <a:p>
             <a:pPr lvl="0"/>
             <a:r>
-              <a:rPr lang="en-US" smtClean="0"/>
+              <a:rPr lang="en-US"/>
               <a:t>Click to edit Master text styles</a:t>
             </a:r>
           </a:p>
@@ -2258,7 +2258,7 @@
           <a:p>
             <a:fld id="{5BCAD085-E8A6-8845-BD4E-CB4CCA059FC4}" type="datetimeFigureOut">
               <a:rPr lang="en-US" smtClean="0"/>
-              <a:t>1/27/13</a:t>
+              <a:t>9/3/2025</a:t>
             </a:fld>
             <a:endParaRPr lang="en-US"/>
           </a:p>
@@ -2361,10 +2361,9 @@
           </a:lstStyle>
           <a:p>
             <a:r>
-              <a:rPr lang="en-US" smtClean="0"/>
+              <a:rPr lang="en-US"/>
               <a:t>Click to edit Master title style</a:t>
             </a:r>
-            <a:endParaRPr lang="en-US"/>
           </a:p>
         </p:txBody>
       </p:sp>
@@ -2488,7 +2487,7 @@
           <a:p>
             <a:pPr lvl="0"/>
             <a:r>
-              <a:rPr lang="en-US" smtClean="0"/>
+              <a:rPr lang="en-US"/>
               <a:t>Click to edit Master text styles</a:t>
             </a:r>
           </a:p>
@@ -2511,7 +2510,7 @@
           <a:p>
             <a:fld id="{5BCAD085-E8A6-8845-BD4E-CB4CCA059FC4}" type="datetimeFigureOut">
               <a:rPr lang="en-US" smtClean="0"/>
-              <a:t>1/27/13</a:t>
+              <a:t>9/3/2025</a:t>
             </a:fld>
             <a:endParaRPr lang="en-US"/>
           </a:p>
@@ -2620,10 +2619,9 @@
           <a:lstStyle/>
           <a:p>
             <a:r>
-              <a:rPr lang="en-US" smtClean="0"/>
+              <a:rPr lang="en-US"/>
               <a:t>Click to edit Master title style</a:t>
             </a:r>
-            <a:endParaRPr lang="en-US"/>
           </a:p>
         </p:txBody>
       </p:sp>
@@ -2654,38 +2652,37 @@
           <a:p>
             <a:pPr lvl="0"/>
             <a:r>
-              <a:rPr lang="en-US" smtClean="0"/>
+              <a:rPr lang="en-US"/>
               <a:t>Click to edit Master text styles</a:t>
             </a:r>
           </a:p>
           <a:p>
             <a:pPr lvl="1"/>
             <a:r>
-              <a:rPr lang="en-US" smtClean="0"/>
+              <a:rPr lang="en-US"/>
               <a:t>Second level</a:t>
             </a:r>
           </a:p>
           <a:p>
             <a:pPr lvl="2"/>
             <a:r>
-              <a:rPr lang="en-US" smtClean="0"/>
+              <a:rPr lang="en-US"/>
               <a:t>Third level</a:t>
             </a:r>
           </a:p>
           <a:p>
             <a:pPr lvl="3"/>
             <a:r>
-              <a:rPr lang="en-US" smtClean="0"/>
+              <a:rPr lang="en-US"/>
               <a:t>Fourth level</a:t>
             </a:r>
           </a:p>
           <a:p>
             <a:pPr lvl="4"/>
             <a:r>
-              <a:rPr lang="en-US" smtClean="0"/>
+              <a:rPr lang="en-US"/>
               <a:t>Fifth level</a:t>
             </a:r>
-            <a:endParaRPr lang="en-US"/>
           </a:p>
         </p:txBody>
       </p:sp>
@@ -2724,7 +2721,7 @@
           <a:p>
             <a:fld id="{5BCAD085-E8A6-8845-BD4E-CB4CCA059FC4}" type="datetimeFigureOut">
               <a:rPr lang="en-US" smtClean="0"/>
-              <a:t>1/27/13</a:t>
+              <a:t>9/3/2025</a:t>
             </a:fld>
             <a:endParaRPr lang="en-US"/>
           </a:p>
@@ -3083,15 +3080,250 @@
 </file>
 
 <file path=ppt/slides/slide1.xml><?xml version="1.0" encoding="utf-8"?>
-<p:sld xmlns:a="http://schemas.openxmlformats.org/drawingml/2006/main" xmlns:p="http://schemas.openxmlformats.org/presentationml/2006/main" xmlns:r="http://schemas.openxmlformats.org/officeDocument/2006/relationships">
+<p:sld xmlns:a="http://schemas.openxmlformats.org/drawingml/2006/main" xmlns:r="http://schemas.openxmlformats.org/officeDocument/2006/relationships" xmlns:p="http://schemas.openxmlformats.org/presentationml/2006/main">
   <p:cSld>
+    <p:bg>
+      <p:bgPr>
+        <a:solidFill>
+          <a:schemeClr val="bg1"/>
+        </a:solidFill>
+        <a:effectLst/>
+      </p:bgPr>
+    </p:bg>
     <p:spTree>
       <p:nvGrpSpPr>
         <p:cNvPr id="1" name=""/>
         <p:cNvGrpSpPr/>
         <p:nvPr/>
       </p:nvGrpSpPr>
-      <p:grpSpPr/>
+      <p:grpSpPr>
+        <a:xfrm>
+          <a:off x="0" y="0"/>
+          <a:ext cx="0" cy="0"/>
+          <a:chOff x="0" y="0"/>
+          <a:chExt cx="0" cy="0"/>
+        </a:xfrm>
+      </p:grpSpPr>
+      <p:sp useBgFill="1">
+        <p:nvSpPr>
+          <p:cNvPr id="44" name="Rectangle 43">
+            <a:extLst>
+              <a:ext uri="{FF2B5EF4-FFF2-40B4-BE49-F238E27FC236}">
+                <a16:creationId xmlns:a16="http://schemas.microsoft.com/office/drawing/2014/main" id="{B9D7E975-9161-4F2D-AC53-69E1912F6B5D}"/>
+              </a:ext>
+              <a:ext uri="{C183D7F6-B498-43B3-948B-1728B52AA6E4}">
+                <adec:decorative xmlns:adec="http://schemas.microsoft.com/office/drawing/2017/decorative" val="1"/>
+              </a:ext>
+            </a:extLst>
+          </p:cNvPr>
+          <p:cNvSpPr>
+            <a:spLocks noGrp="1" noRot="1" noChangeAspect="1" noMove="1" noResize="1" noEditPoints="1" noAdjustHandles="1" noChangeArrowheads="1" noChangeShapeType="1" noTextEdit="1"/>
+          </p:cNvSpPr>
+          <p:nvPr>
+            <p:extLst>
+              <p:ext uri="{386F3935-93C4-4BCD-93E2-E3B085C9AB24}">
+                <p16:designElem xmlns:p16="http://schemas.microsoft.com/office/powerpoint/2015/main" val="1"/>
+              </p:ext>
+            </p:extLst>
+          </p:nvPr>
+        </p:nvSpPr>
+        <p:spPr>
+          <a:xfrm>
+            <a:off x="0" y="0"/>
+            <a:ext cx="9144000" cy="6858000"/>
+          </a:xfrm>
+          <a:prstGeom prst="rect">
+            <a:avLst/>
+          </a:prstGeom>
+          <a:ln>
+            <a:noFill/>
+          </a:ln>
+        </p:spPr>
+        <p:style>
+          <a:lnRef idx="2">
+            <a:schemeClr val="accent1">
+              <a:shade val="50000"/>
+            </a:schemeClr>
+          </a:lnRef>
+          <a:fillRef idx="1">
+            <a:schemeClr val="accent1"/>
+          </a:fillRef>
+          <a:effectRef idx="0">
+            <a:schemeClr val="accent1"/>
+          </a:effectRef>
+          <a:fontRef idx="minor">
+            <a:schemeClr val="lt1"/>
+          </a:fontRef>
+        </p:style>
+        <p:txBody>
+          <a:bodyPr rtlCol="0" anchor="ctr"/>
+          <a:lstStyle/>
+          <a:p>
+            <a:pPr algn="ctr"/>
+            <a:endParaRPr lang="en-US"/>
+          </a:p>
+        </p:txBody>
+      </p:sp>
+      <p:pic>
+        <p:nvPicPr>
+          <p:cNvPr id="5" name="Picture 4" descr="A white car with a plug in the middle&#10;&#10;AI-generated content may be incorrect.">
+            <a:extLst>
+              <a:ext uri="{FF2B5EF4-FFF2-40B4-BE49-F238E27FC236}">
+                <a16:creationId xmlns:a16="http://schemas.microsoft.com/office/drawing/2014/main" id="{EB420AFB-32BD-3EA5-FB30-93E2EE42B1E4}"/>
+              </a:ext>
+            </a:extLst>
+          </p:cNvPr>
+          <p:cNvPicPr>
+            <a:picLocks noChangeAspect="1"/>
+          </p:cNvPicPr>
+          <p:nvPr/>
+        </p:nvPicPr>
+        <p:blipFill>
+          <a:blip r:embed="rId2"/>
+          <a:srcRect l="1453" r="6725" b="-1"/>
+          <a:stretch>
+            <a:fillRect/>
+          </a:stretch>
+        </p:blipFill>
+        <p:spPr>
+          <a:xfrm>
+            <a:off x="466256" y="1191486"/>
+            <a:ext cx="4105742" cy="4471459"/>
+          </a:xfrm>
+          <a:prstGeom prst="rect">
+            <a:avLst/>
+          </a:prstGeom>
+        </p:spPr>
+      </p:pic>
+      <p:sp>
+        <p:nvSpPr>
+          <p:cNvPr id="45" name="Right Triangle 44">
+            <a:extLst>
+              <a:ext uri="{FF2B5EF4-FFF2-40B4-BE49-F238E27FC236}">
+                <a16:creationId xmlns:a16="http://schemas.microsoft.com/office/drawing/2014/main" id="{827DC2C4-B485-428A-BF4A-472D2967F47F}"/>
+              </a:ext>
+              <a:ext uri="{C183D7F6-B498-43B3-948B-1728B52AA6E4}">
+                <adec:decorative xmlns:adec="http://schemas.microsoft.com/office/drawing/2017/decorative" val="1"/>
+              </a:ext>
+            </a:extLst>
+          </p:cNvPr>
+          <p:cNvSpPr>
+            <a:spLocks noGrp="1" noRot="1" noChangeAspect="1" noMove="1" noResize="1" noEditPoints="1" noAdjustHandles="1" noChangeArrowheads="1" noChangeShapeType="1" noTextEdit="1"/>
+          </p:cNvSpPr>
+          <p:nvPr>
+            <p:extLst>
+              <p:ext uri="{386F3935-93C4-4BCD-93E2-E3B085C9AB24}">
+                <p16:designElem xmlns:p16="http://schemas.microsoft.com/office/powerpoint/2015/main" val="1"/>
+              </p:ext>
+            </p:extLst>
+          </p:nvPr>
+        </p:nvSpPr>
+        <p:spPr>
+          <a:xfrm flipH="1">
+            <a:off x="6432540" y="3335867"/>
+            <a:ext cx="2468880" cy="3200400"/>
+          </a:xfrm>
+          <a:prstGeom prst="rtTriangle">
+            <a:avLst/>
+          </a:prstGeom>
+          <a:solidFill>
+            <a:schemeClr val="accent4"/>
+          </a:solidFill>
+          <a:ln>
+            <a:noFill/>
+          </a:ln>
+        </p:spPr>
+        <p:style>
+          <a:lnRef idx="2">
+            <a:schemeClr val="accent1">
+              <a:shade val="50000"/>
+            </a:schemeClr>
+          </a:lnRef>
+          <a:fillRef idx="1">
+            <a:schemeClr val="accent1"/>
+          </a:fillRef>
+          <a:effectRef idx="0">
+            <a:schemeClr val="accent1"/>
+          </a:effectRef>
+          <a:fontRef idx="minor">
+            <a:schemeClr val="lt1"/>
+          </a:fontRef>
+        </p:style>
+        <p:txBody>
+          <a:bodyPr rtlCol="0" anchor="ctr"/>
+          <a:lstStyle/>
+          <a:p>
+            <a:pPr algn="ctr"/>
+            <a:endParaRPr lang="en-US" dirty="0"/>
+          </a:p>
+        </p:txBody>
+      </p:sp>
+      <p:sp>
+        <p:nvSpPr>
+          <p:cNvPr id="46" name="Rectangle 45">
+            <a:extLst>
+              <a:ext uri="{FF2B5EF4-FFF2-40B4-BE49-F238E27FC236}">
+                <a16:creationId xmlns:a16="http://schemas.microsoft.com/office/drawing/2014/main" id="{463E6235-1649-4B47-9862-4026FC473B6F}"/>
+              </a:ext>
+              <a:ext uri="{C183D7F6-B498-43B3-948B-1728B52AA6E4}">
+                <adec:decorative xmlns:adec="http://schemas.microsoft.com/office/drawing/2017/decorative" val="1"/>
+              </a:ext>
+            </a:extLst>
+          </p:cNvPr>
+          <p:cNvSpPr>
+            <a:spLocks noGrp="1" noRot="1" noChangeAspect="1" noMove="1" noResize="1" noEditPoints="1" noAdjustHandles="1" noChangeArrowheads="1" noChangeShapeType="1" noTextEdit="1"/>
+          </p:cNvSpPr>
+          <p:nvPr>
+            <p:extLst>
+              <p:ext uri="{386F3935-93C4-4BCD-93E2-E3B085C9AB24}">
+                <p16:designElem xmlns:p16="http://schemas.microsoft.com/office/powerpoint/2015/main" val="1"/>
+              </p:ext>
+            </p:extLst>
+          </p:nvPr>
+        </p:nvSpPr>
+        <p:spPr>
+          <a:xfrm>
+            <a:off x="4803900" y="623275"/>
+            <a:ext cx="3856220" cy="5607882"/>
+          </a:xfrm>
+          <a:prstGeom prst="rect">
+            <a:avLst/>
+          </a:prstGeom>
+          <a:noFill/>
+          <a:ln w="19050">
+            <a:solidFill>
+              <a:schemeClr val="tx1">
+                <a:lumMod val="75000"/>
+                <a:lumOff val="25000"/>
+              </a:schemeClr>
+            </a:solidFill>
+          </a:ln>
+        </p:spPr>
+        <p:style>
+          <a:lnRef idx="2">
+            <a:schemeClr val="accent1">
+              <a:shade val="50000"/>
+            </a:schemeClr>
+          </a:lnRef>
+          <a:fillRef idx="1">
+            <a:schemeClr val="accent1"/>
+          </a:fillRef>
+          <a:effectRef idx="0">
+            <a:schemeClr val="accent1"/>
+          </a:effectRef>
+          <a:fontRef idx="minor">
+            <a:schemeClr val="lt1"/>
+          </a:fontRef>
+        </p:style>
+        <p:txBody>
+          <a:bodyPr rtlCol="0" anchor="ctr"/>
+          <a:lstStyle/>
+          <a:p>
+            <a:pPr algn="ctr"/>
+            <a:endParaRPr lang="en-US"/>
+          </a:p>
+        </p:txBody>
+      </p:sp>
       <p:sp>
         <p:nvSpPr>
           <p:cNvPr id="2" name="Title 1"/>
@@ -3102,12 +3334,25 @@
             <p:ph type="ctrTitle"/>
           </p:nvPr>
         </p:nvSpPr>
-        <p:spPr/>
-        <p:txBody>
-          <a:bodyPr/>
-          <a:lstStyle/>
-          <a:p>
-            <a:r>
+        <p:spPr>
+          <a:xfrm>
+            <a:off x="5167374" y="1056640"/>
+            <a:ext cx="3270243" cy="3494398"/>
+          </a:xfrm>
+        </p:spPr>
+        <p:txBody>
+          <a:bodyPr anchor="b">
+            <a:normAutofit/>
+          </a:bodyPr>
+          <a:lstStyle/>
+          <a:p>
+            <a:pPr algn="l">
+              <a:lnSpc>
+                <a:spcPct val="90000"/>
+              </a:lnSpc>
+            </a:pPr>
+            <a:r>
+              <a:rPr lang="en-US" sz="5400"/>
               <a:t>Electric Vehicle Population Analysis</a:t>
             </a:r>
           </a:p>
@@ -3123,18 +3368,382 @@
             <p:ph type="subTitle" idx="1"/>
           </p:nvPr>
         </p:nvSpPr>
-        <p:spPr/>
-        <p:txBody>
-          <a:bodyPr/>
-          <a:lstStyle/>
-          <a:p>
-            <a:r>
-              <a:t>Auto-generated via Python</a:t>
-            </a:r>
+        <p:spPr>
+          <a:xfrm>
+            <a:off x="5167374" y="4582814"/>
+            <a:ext cx="2096142" cy="1186335"/>
+          </a:xfrm>
+        </p:spPr>
+        <p:txBody>
+          <a:bodyPr anchor="t">
+            <a:normAutofit/>
+          </a:bodyPr>
+          <a:lstStyle/>
+          <a:p>
+            <a:pPr algn="l"/>
+            <a:r>
+              <a:rPr lang="en-US" sz="1700" i="1"/>
+              <a:t>Data exploration and automated reporting with Python</a:t>
+            </a:r>
+            <a:endParaRPr lang="en-US" sz="1700"/>
           </a:p>
         </p:txBody>
       </p:sp>
     </p:spTree>
+  </p:cSld>
+  <p:clrMapOvr>
+    <a:masterClrMapping/>
+  </p:clrMapOvr>
+  <p:timing>
+    <p:tnLst>
+      <p:par>
+        <p:cTn id="1" dur="indefinite" restart="never" nodeType="tmRoot">
+          <p:childTnLst>
+            <p:seq concurrent="1" nextAc="seek">
+              <p:cTn id="2" dur="indefinite" nodeType="mainSeq">
+                <p:childTnLst>
+                  <p:par>
+                    <p:cTn id="3" fill="hold">
+                      <p:stCondLst>
+                        <p:cond delay="indefinite"/>
+                        <p:cond evt="onBegin" delay="0">
+                          <p:tn val="2"/>
+                        </p:cond>
+                      </p:stCondLst>
+                      <p:childTnLst>
+                        <p:par>
+                          <p:cTn id="4" fill="hold">
+                            <p:stCondLst>
+                              <p:cond delay="0"/>
+                            </p:stCondLst>
+                            <p:childTnLst>
+                              <p:par>
+                                <p:cTn id="5" presetID="10" presetClass="entr" presetSubtype="0" fill="hold" grpId="0" nodeType="withEffect">
+                                  <p:stCondLst>
+                                    <p:cond delay="1000"/>
+                                  </p:stCondLst>
+                                  <p:iterate type="lt">
+                                    <p:tmPct val="10000"/>
+                                  </p:iterate>
+                                  <p:childTnLst>
+                                    <p:set>
+                                      <p:cBhvr>
+                                        <p:cTn id="6" dur="1" fill="hold">
+                                          <p:stCondLst>
+                                            <p:cond delay="0"/>
+                                          </p:stCondLst>
+                                        </p:cTn>
+                                        <p:tgtEl>
+                                          <p:spTgt spid="2"/>
+                                        </p:tgtEl>
+                                        <p:attrNameLst>
+                                          <p:attrName>style.visibility</p:attrName>
+                                        </p:attrNameLst>
+                                      </p:cBhvr>
+                                      <p:to>
+                                        <p:strVal val="visible"/>
+                                      </p:to>
+                                    </p:set>
+                                    <p:animEffect transition="in" filter="fade">
+                                      <p:cBhvr>
+                                        <p:cTn id="7" dur="400"/>
+                                        <p:tgtEl>
+                                          <p:spTgt spid="2"/>
+                                        </p:tgtEl>
+                                      </p:cBhvr>
+                                    </p:animEffect>
+                                  </p:childTnLst>
+                                </p:cTn>
+                              </p:par>
+                              <p:par>
+                                <p:cTn id="8" presetID="10" presetClass="entr" presetSubtype="0" fill="hold" grpId="0" nodeType="withEffect">
+                                  <p:stCondLst>
+                                    <p:cond delay="2000"/>
+                                  </p:stCondLst>
+                                  <p:iterate type="lt">
+                                    <p:tmPct val="10000"/>
+                                  </p:iterate>
+                                  <p:childTnLst>
+                                    <p:set>
+                                      <p:cBhvr>
+                                        <p:cTn id="9" dur="1" fill="hold">
+                                          <p:stCondLst>
+                                            <p:cond delay="0"/>
+                                          </p:stCondLst>
+                                        </p:cTn>
+                                        <p:tgtEl>
+                                          <p:spTgt spid="3">
+                                            <p:txEl>
+                                              <p:pRg st="0" end="0"/>
+                                            </p:txEl>
+                                          </p:spTgt>
+                                        </p:tgtEl>
+                                        <p:attrNameLst>
+                                          <p:attrName>style.visibility</p:attrName>
+                                        </p:attrNameLst>
+                                      </p:cBhvr>
+                                      <p:to>
+                                        <p:strVal val="visible"/>
+                                      </p:to>
+                                    </p:set>
+                                    <p:animEffect transition="in" filter="fade">
+                                      <p:cBhvr>
+                                        <p:cTn id="10" dur="400"/>
+                                        <p:tgtEl>
+                                          <p:spTgt spid="3">
+                                            <p:txEl>
+                                              <p:pRg st="0" end="0"/>
+                                            </p:txEl>
+                                          </p:spTgt>
+                                        </p:tgtEl>
+                                      </p:cBhvr>
+                                    </p:animEffect>
+                                  </p:childTnLst>
+                                </p:cTn>
+                              </p:par>
+                            </p:childTnLst>
+                          </p:cTn>
+                        </p:par>
+                      </p:childTnLst>
+                    </p:cTn>
+                  </p:par>
+                </p:childTnLst>
+              </p:cTn>
+              <p:prevCondLst>
+                <p:cond evt="onPrev" delay="0">
+                  <p:tgtEl>
+                    <p:sldTgt/>
+                  </p:tgtEl>
+                </p:cond>
+              </p:prevCondLst>
+              <p:nextCondLst>
+                <p:cond evt="onNext" delay="0">
+                  <p:tgtEl>
+                    <p:sldTgt/>
+                  </p:tgtEl>
+                </p:cond>
+              </p:nextCondLst>
+            </p:seq>
+          </p:childTnLst>
+        </p:cTn>
+      </p:par>
+    </p:tnLst>
+    <p:bldLst>
+      <p:bldP spid="2" grpId="0"/>
+      <p:bldP spid="3" grpId="0" build="p"/>
+    </p:bldLst>
+  </p:timing>
+</p:sld>
+</file>
+
+<file path=ppt/slides/slide2.xml><?xml version="1.0" encoding="utf-8"?>
+<p:sld xmlns:a="http://schemas.openxmlformats.org/drawingml/2006/main" xmlns:r="http://schemas.openxmlformats.org/officeDocument/2006/relationships" xmlns:p="http://schemas.openxmlformats.org/presentationml/2006/main">
+  <p:cSld>
+    <p:bg>
+      <p:bgPr>
+        <a:solidFill>
+          <a:schemeClr val="bg1"/>
+        </a:solidFill>
+        <a:effectLst/>
+      </p:bgPr>
+    </p:bg>
+    <p:spTree>
+      <p:nvGrpSpPr>
+        <p:cNvPr id="1" name=""/>
+        <p:cNvGrpSpPr/>
+        <p:nvPr/>
+      </p:nvGrpSpPr>
+      <p:grpSpPr>
+        <a:xfrm>
+          <a:off x="0" y="0"/>
+          <a:ext cx="0" cy="0"/>
+          <a:chOff x="0" y="0"/>
+          <a:chExt cx="0" cy="0"/>
+        </a:xfrm>
+      </p:grpSpPr>
+      <p:sp>
+        <p:nvSpPr>
+          <p:cNvPr id="2" name="Title 1">
+            <a:extLst>
+              <a:ext uri="{FF2B5EF4-FFF2-40B4-BE49-F238E27FC236}">
+                <a16:creationId xmlns:a16="http://schemas.microsoft.com/office/drawing/2014/main" id="{2422BCF0-99D7-46D8-BAA3-03961F81D451}"/>
+              </a:ext>
+            </a:extLst>
+          </p:cNvPr>
+          <p:cNvSpPr>
+            <a:spLocks noGrp="1"/>
+          </p:cNvSpPr>
+          <p:nvPr>
+            <p:ph type="title"/>
+          </p:nvPr>
+        </p:nvSpPr>
+        <p:spPr>
+          <a:xfrm>
+            <a:off x="4401417" y="1138036"/>
+            <a:ext cx="4083287" cy="1402470"/>
+          </a:xfrm>
+        </p:spPr>
+        <p:txBody>
+          <a:bodyPr anchor="t">
+            <a:normAutofit/>
+          </a:bodyPr>
+          <a:lstStyle/>
+          <a:p>
+            <a:r>
+              <a:rPr lang="en-US" sz="2800"/>
+              <a:t>Introduction</a:t>
+            </a:r>
+          </a:p>
+        </p:txBody>
+      </p:sp>
+      <p:pic>
+        <p:nvPicPr>
+          <p:cNvPr id="21" name="Picture 20" descr="Large car parking lot from above">
+            <a:extLst>
+              <a:ext uri="{FF2B5EF4-FFF2-40B4-BE49-F238E27FC236}">
+                <a16:creationId xmlns:a16="http://schemas.microsoft.com/office/drawing/2014/main" id="{8616C3AA-44D6-D612-BBC1-D9D4EE183AC8}"/>
+              </a:ext>
+            </a:extLst>
+          </p:cNvPr>
+          <p:cNvPicPr>
+            <a:picLocks noChangeAspect="1"/>
+          </p:cNvPicPr>
+          <p:nvPr/>
+        </p:nvPicPr>
+        <p:blipFill>
+          <a:blip r:embed="rId2"/>
+          <a:srcRect l="15197" r="47341"/>
+          <a:stretch>
+            <a:fillRect/>
+          </a:stretch>
+        </p:blipFill>
+        <p:spPr>
+          <a:xfrm>
+            <a:off x="20" y="10"/>
+            <a:ext cx="3863363" cy="6857990"/>
+          </a:xfrm>
+          <a:prstGeom prst="rect">
+            <a:avLst/>
+          </a:prstGeom>
+        </p:spPr>
+      </p:pic>
+      <p:cxnSp>
+        <p:nvCxnSpPr>
+          <p:cNvPr id="22" name="Straight Connector 21">
+            <a:extLst>
+              <a:ext uri="{FF2B5EF4-FFF2-40B4-BE49-F238E27FC236}">
+                <a16:creationId xmlns:a16="http://schemas.microsoft.com/office/drawing/2014/main" id="{1503BFE4-729B-D9D0-C17B-501E6AF1127A}"/>
+              </a:ext>
+              <a:ext uri="{C183D7F6-B498-43B3-948B-1728B52AA6E4}">
+                <adec:decorative xmlns:adec="http://schemas.microsoft.com/office/drawing/2017/decorative" val="1"/>
+              </a:ext>
+            </a:extLst>
+          </p:cNvPr>
+          <p:cNvCxnSpPr>
+            <a:cxnSpLocks noGrp="1" noRot="1" noChangeAspect="1" noMove="1" noResize="1" noEditPoints="1" noAdjustHandles="1" noChangeArrowheads="1" noChangeShapeType="1"/>
+          </p:cNvCxnSpPr>
+          <p:nvPr>
+            <p:extLst>
+              <p:ext uri="{386F3935-93C4-4BCD-93E2-E3B085C9AB24}">
+                <p16:designElem xmlns:p16="http://schemas.microsoft.com/office/powerpoint/2015/main" val="1"/>
+              </p:ext>
+            </p:extLst>
+          </p:nvPr>
+        </p:nvCxnSpPr>
+        <p:spPr>
+          <a:xfrm>
+            <a:off x="4478772" y="871146"/>
+            <a:ext cx="552705" cy="0"/>
+          </a:xfrm>
+          <a:prstGeom prst="line">
+            <a:avLst/>
+          </a:prstGeom>
+          <a:ln w="57150">
+            <a:solidFill>
+              <a:schemeClr val="accent4"/>
+            </a:solidFill>
+          </a:ln>
+        </p:spPr>
+        <p:style>
+          <a:lnRef idx="1">
+            <a:schemeClr val="accent1"/>
+          </a:lnRef>
+          <a:fillRef idx="0">
+            <a:schemeClr val="accent1"/>
+          </a:fillRef>
+          <a:effectRef idx="0">
+            <a:schemeClr val="accent1"/>
+          </a:effectRef>
+          <a:fontRef idx="minor">
+            <a:schemeClr val="tx1"/>
+          </a:fontRef>
+        </p:style>
+      </p:cxnSp>
+      <p:sp>
+        <p:nvSpPr>
+          <p:cNvPr id="23" name="Content Placeholder 2">
+            <a:extLst>
+              <a:ext uri="{FF2B5EF4-FFF2-40B4-BE49-F238E27FC236}">
+                <a16:creationId xmlns:a16="http://schemas.microsoft.com/office/drawing/2014/main" id="{6D753EC8-73D0-8457-B332-C2B7A6E1B320}"/>
+              </a:ext>
+            </a:extLst>
+          </p:cNvPr>
+          <p:cNvSpPr>
+            <a:spLocks noGrp="1"/>
+          </p:cNvSpPr>
+          <p:nvPr>
+            <p:ph idx="1"/>
+          </p:nvPr>
+        </p:nvSpPr>
+        <p:spPr>
+          <a:xfrm>
+            <a:off x="4401417" y="2551176"/>
+            <a:ext cx="4083287" cy="3591207"/>
+          </a:xfrm>
+        </p:spPr>
+        <p:txBody>
+          <a:bodyPr>
+            <a:normAutofit/>
+          </a:bodyPr>
+          <a:lstStyle/>
+          <a:p>
+            <a:endParaRPr lang="en-US" sz="1700"/>
+          </a:p>
+          <a:p>
+            <a:r>
+              <a:rPr lang="en-US" sz="1700"/>
+              <a:t>Dataset: ~250,000 rows of EV registrations</a:t>
+            </a:r>
+          </a:p>
+          <a:p>
+            <a:r>
+              <a:rPr lang="en-US" sz="1700"/>
+              <a:t>Time span: 2000–2023</a:t>
+            </a:r>
+          </a:p>
+          <a:p>
+            <a:r>
+              <a:rPr lang="en-US" sz="1700"/>
+              <a:t>Goal: Explore EV adoption trends, brand distribution, vehicle types, and the link between electric range and price</a:t>
+            </a:r>
+          </a:p>
+          <a:p>
+            <a:r>
+              <a:rPr lang="en-US" sz="1700"/>
+              <a:t>Tools: Python (pandas, matplotlib, python-pptx)</a:t>
+            </a:r>
+          </a:p>
+          <a:p>
+            <a:endParaRPr lang="en-US" sz="1700"/>
+          </a:p>
+        </p:txBody>
+      </p:sp>
+    </p:spTree>
+    <p:extLst>
+      <p:ext uri="{BB962C8B-B14F-4D97-AF65-F5344CB8AC3E}">
+        <p14:creationId xmlns:p14="http://schemas.microsoft.com/office/powerpoint/2010/main" val="1571711321"/>
+      </p:ext>
+    </p:extLst>
   </p:cSld>
   <p:clrMapOvr>
     <a:masterClrMapping/>
@@ -3142,40 +3751,100 @@
 </p:sld>
 </file>
 
-<file path=ppt/slides/slide2.xml><?xml version="1.0" encoding="utf-8"?>
-<p:sld xmlns:a="http://schemas.openxmlformats.org/drawingml/2006/main" xmlns:p="http://schemas.openxmlformats.org/presentationml/2006/main" xmlns:r="http://schemas.openxmlformats.org/officeDocument/2006/relationships">
+<file path=ppt/slides/slide3.xml><?xml version="1.0" encoding="utf-8"?>
+<p:sld xmlns:a="http://schemas.openxmlformats.org/drawingml/2006/main" xmlns:r="http://schemas.openxmlformats.org/officeDocument/2006/relationships" xmlns:p="http://schemas.openxmlformats.org/presentationml/2006/main">
   <p:cSld>
+    <p:bg>
+      <p:bgPr>
+        <a:solidFill>
+          <a:schemeClr val="bg1"/>
+        </a:solidFill>
+        <a:effectLst/>
+      </p:bgPr>
+    </p:bg>
     <p:spTree>
       <p:nvGrpSpPr>
         <p:cNvPr id="1" name=""/>
         <p:cNvGrpSpPr/>
         <p:nvPr/>
       </p:nvGrpSpPr>
-      <p:grpSpPr/>
-      <p:sp>
-        <p:nvSpPr>
-          <p:cNvPr id="2" name="Title 1"/>
-          <p:cNvSpPr>
-            <a:spLocks noGrp="1"/>
-          </p:cNvSpPr>
-          <p:nvPr>
-            <p:ph type="title"/>
-          </p:nvPr>
-        </p:nvSpPr>
-        <p:spPr/>
-        <p:txBody>
-          <a:bodyPr/>
-          <a:lstStyle/>
-          <a:p>
-            <a:r>
-              <a:t>EV Registrations Over Time</a:t>
-            </a:r>
+      <p:grpSpPr>
+        <a:xfrm>
+          <a:off x="0" y="0"/>
+          <a:ext cx="0" cy="0"/>
+          <a:chOff x="0" y="0"/>
+          <a:chExt cx="0" cy="0"/>
+        </a:xfrm>
+      </p:grpSpPr>
+      <p:sp useBgFill="1">
+        <p:nvSpPr>
+          <p:cNvPr id="8" name="Rectangle 7">
+            <a:extLst>
+              <a:ext uri="{FF2B5EF4-FFF2-40B4-BE49-F238E27FC236}">
+                <a16:creationId xmlns:a16="http://schemas.microsoft.com/office/drawing/2014/main" id="{B9D7E975-9161-4F2D-AC53-69E1912F6B5D}"/>
+              </a:ext>
+              <a:ext uri="{C183D7F6-B498-43B3-948B-1728B52AA6E4}">
+                <adec:decorative xmlns:adec="http://schemas.microsoft.com/office/drawing/2017/decorative" val="1"/>
+              </a:ext>
+            </a:extLst>
+          </p:cNvPr>
+          <p:cNvSpPr>
+            <a:spLocks noGrp="1" noRot="1" noChangeAspect="1" noMove="1" noResize="1" noEditPoints="1" noAdjustHandles="1" noChangeArrowheads="1" noChangeShapeType="1" noTextEdit="1"/>
+          </p:cNvSpPr>
+          <p:nvPr>
+            <p:extLst>
+              <p:ext uri="{386F3935-93C4-4BCD-93E2-E3B085C9AB24}">
+                <p16:designElem xmlns:p16="http://schemas.microsoft.com/office/powerpoint/2015/main" val="1"/>
+              </p:ext>
+            </p:extLst>
+          </p:nvPr>
+        </p:nvSpPr>
+        <p:spPr>
+          <a:xfrm>
+            <a:off x="0" y="0"/>
+            <a:ext cx="9144000" cy="6858000"/>
+          </a:xfrm>
+          <a:prstGeom prst="rect">
+            <a:avLst/>
+          </a:prstGeom>
+          <a:ln>
+            <a:noFill/>
+          </a:ln>
+        </p:spPr>
+        <p:style>
+          <a:lnRef idx="2">
+            <a:schemeClr val="accent1">
+              <a:shade val="50000"/>
+            </a:schemeClr>
+          </a:lnRef>
+          <a:fillRef idx="1">
+            <a:schemeClr val="accent1"/>
+          </a:fillRef>
+          <a:effectRef idx="0">
+            <a:schemeClr val="accent1"/>
+          </a:effectRef>
+          <a:fontRef idx="minor">
+            <a:schemeClr val="lt1"/>
+          </a:fontRef>
+        </p:style>
+        <p:txBody>
+          <a:bodyPr rtlCol="0" anchor="ctr"/>
+          <a:lstStyle/>
+          <a:p>
+            <a:pPr algn="ctr"/>
+            <a:endParaRPr lang="en-US"/>
           </a:p>
         </p:txBody>
       </p:sp>
       <p:pic>
         <p:nvPicPr>
-          <p:cNvPr id="3" name="Picture 2" descr="trend.png"/>
+          <p:cNvPr id="3" name="Picture 2" descr="trend.png">
+            <a:extLst>
+              <a:ext uri="{C183D7F6-B498-43B3-948B-1728B52AA6E4}">
+                <adec:decorative xmlns:adec="http://schemas.microsoft.com/office/drawing/2017/decorative" val="0"/>
+              </a:ext>
+            </a:extLst>
+          </p:cNvPr>
           <p:cNvPicPr>
             <a:picLocks noChangeAspect="1"/>
           </p:cNvPicPr>
@@ -3189,14 +3858,281 @@
         </p:blipFill>
         <p:spPr>
           <a:xfrm>
-            <a:off x="914400" y="1371600"/>
-            <a:ext cx="7315200" cy="5650961"/>
+            <a:off x="466256" y="1518309"/>
+            <a:ext cx="4942153" cy="3817813"/>
           </a:xfrm>
           <a:prstGeom prst="rect">
             <a:avLst/>
           </a:prstGeom>
         </p:spPr>
       </p:pic>
+      <p:sp>
+        <p:nvSpPr>
+          <p:cNvPr id="10" name="Right Triangle 9">
+            <a:extLst>
+              <a:ext uri="{FF2B5EF4-FFF2-40B4-BE49-F238E27FC236}">
+                <a16:creationId xmlns:a16="http://schemas.microsoft.com/office/drawing/2014/main" id="{827DC2C4-B485-428A-BF4A-472D2967F47F}"/>
+              </a:ext>
+              <a:ext uri="{C183D7F6-B498-43B3-948B-1728B52AA6E4}">
+                <adec:decorative xmlns:adec="http://schemas.microsoft.com/office/drawing/2017/decorative" val="1"/>
+              </a:ext>
+            </a:extLst>
+          </p:cNvPr>
+          <p:cNvSpPr>
+            <a:spLocks noGrp="1" noRot="1" noChangeAspect="1" noMove="1" noResize="1" noEditPoints="1" noAdjustHandles="1" noChangeArrowheads="1" noChangeShapeType="1" noTextEdit="1"/>
+          </p:cNvSpPr>
+          <p:nvPr>
+            <p:extLst>
+              <p:ext uri="{386F3935-93C4-4BCD-93E2-E3B085C9AB24}">
+                <p16:designElem xmlns:p16="http://schemas.microsoft.com/office/powerpoint/2015/main" val="1"/>
+              </p:ext>
+            </p:extLst>
+          </p:nvPr>
+        </p:nvSpPr>
+        <p:spPr>
+          <a:xfrm flipH="1">
+            <a:off x="6432540" y="3335867"/>
+            <a:ext cx="2468880" cy="3200400"/>
+          </a:xfrm>
+          <a:prstGeom prst="rtTriangle">
+            <a:avLst/>
+          </a:prstGeom>
+          <a:solidFill>
+            <a:schemeClr val="accent4"/>
+          </a:solidFill>
+          <a:ln>
+            <a:noFill/>
+          </a:ln>
+        </p:spPr>
+        <p:style>
+          <a:lnRef idx="2">
+            <a:schemeClr val="accent1">
+              <a:shade val="50000"/>
+            </a:schemeClr>
+          </a:lnRef>
+          <a:fillRef idx="1">
+            <a:schemeClr val="accent1"/>
+          </a:fillRef>
+          <a:effectRef idx="0">
+            <a:schemeClr val="accent1"/>
+          </a:effectRef>
+          <a:fontRef idx="minor">
+            <a:schemeClr val="lt1"/>
+          </a:fontRef>
+        </p:style>
+        <p:txBody>
+          <a:bodyPr rtlCol="0" anchor="ctr"/>
+          <a:lstStyle/>
+          <a:p>
+            <a:pPr algn="ctr"/>
+            <a:endParaRPr lang="en-US" dirty="0"/>
+          </a:p>
+        </p:txBody>
+      </p:sp>
+      <p:sp>
+        <p:nvSpPr>
+          <p:cNvPr id="12" name="Rectangle 11">
+            <a:extLst>
+              <a:ext uri="{FF2B5EF4-FFF2-40B4-BE49-F238E27FC236}">
+                <a16:creationId xmlns:a16="http://schemas.microsoft.com/office/drawing/2014/main" id="{463E6235-1649-4B47-9862-4026FC473B6F}"/>
+              </a:ext>
+              <a:ext uri="{C183D7F6-B498-43B3-948B-1728B52AA6E4}">
+                <adec:decorative xmlns:adec="http://schemas.microsoft.com/office/drawing/2017/decorative" val="1"/>
+              </a:ext>
+            </a:extLst>
+          </p:cNvPr>
+          <p:cNvSpPr>
+            <a:spLocks noGrp="1" noRot="1" noChangeAspect="1" noMove="1" noResize="1" noEditPoints="1" noAdjustHandles="1" noChangeArrowheads="1" noChangeShapeType="1" noTextEdit="1"/>
+          </p:cNvSpPr>
+          <p:nvPr>
+            <p:extLst>
+              <p:ext uri="{386F3935-93C4-4BCD-93E2-E3B085C9AB24}">
+                <p16:designElem xmlns:p16="http://schemas.microsoft.com/office/powerpoint/2015/main" val="1"/>
+              </p:ext>
+            </p:extLst>
+          </p:nvPr>
+        </p:nvSpPr>
+        <p:spPr>
+          <a:xfrm>
+            <a:off x="5650989" y="623275"/>
+            <a:ext cx="3009130" cy="5607882"/>
+          </a:xfrm>
+          <a:prstGeom prst="rect">
+            <a:avLst/>
+          </a:prstGeom>
+          <a:noFill/>
+          <a:ln w="19050">
+            <a:solidFill>
+              <a:schemeClr val="tx1">
+                <a:lumMod val="75000"/>
+                <a:lumOff val="25000"/>
+              </a:schemeClr>
+            </a:solidFill>
+          </a:ln>
+        </p:spPr>
+        <p:style>
+          <a:lnRef idx="2">
+            <a:schemeClr val="accent1">
+              <a:shade val="50000"/>
+            </a:schemeClr>
+          </a:lnRef>
+          <a:fillRef idx="1">
+            <a:schemeClr val="accent1"/>
+          </a:fillRef>
+          <a:effectRef idx="0">
+            <a:schemeClr val="accent1"/>
+          </a:effectRef>
+          <a:fontRef idx="minor">
+            <a:schemeClr val="lt1"/>
+          </a:fontRef>
+        </p:style>
+        <p:txBody>
+          <a:bodyPr rtlCol="0" anchor="ctr"/>
+          <a:lstStyle/>
+          <a:p>
+            <a:pPr algn="ctr"/>
+            <a:endParaRPr lang="en-US"/>
+          </a:p>
+        </p:txBody>
+      </p:sp>
+      <p:sp>
+        <p:nvSpPr>
+          <p:cNvPr id="2" name="Title 1">
+            <a:extLst>
+              <a:ext uri="{C183D7F6-B498-43B3-948B-1728B52AA6E4}">
+                <adec:decorative xmlns:adec="http://schemas.microsoft.com/office/drawing/2017/decorative" val="0"/>
+              </a:ext>
+            </a:extLst>
+          </p:cNvPr>
+          <p:cNvSpPr>
+            <a:spLocks noGrp="1"/>
+          </p:cNvSpPr>
+          <p:nvPr>
+            <p:ph type="title" idx="4294967295"/>
+          </p:nvPr>
+        </p:nvSpPr>
+        <p:spPr>
+          <a:xfrm>
+            <a:off x="6039372" y="1056640"/>
+            <a:ext cx="2398245" cy="3125746"/>
+          </a:xfrm>
+        </p:spPr>
+        <p:txBody>
+          <a:bodyPr vert="horz" lIns="91440" tIns="45720" rIns="91440" bIns="45720" rtlCol="0" anchor="b">
+            <a:normAutofit/>
+          </a:bodyPr>
+          <a:lstStyle/>
+          <a:p>
+            <a:pPr algn="l" defTabSz="914400">
+              <a:lnSpc>
+                <a:spcPct val="90000"/>
+              </a:lnSpc>
+            </a:pPr>
+            <a:br>
+              <a:rPr lang="en-US" sz="2000" kern="1200">
+                <a:solidFill>
+                  <a:schemeClr val="tx1"/>
+                </a:solidFill>
+                <a:latin typeface="+mj-lt"/>
+                <a:ea typeface="+mj-ea"/>
+                <a:cs typeface="+mj-cs"/>
+              </a:rPr>
+            </a:br>
+            <a:r>
+              <a:rPr lang="en-US" sz="2000" b="1" kern="1200">
+                <a:solidFill>
+                  <a:schemeClr val="tx1"/>
+                </a:solidFill>
+                <a:latin typeface="+mj-lt"/>
+                <a:ea typeface="+mj-ea"/>
+                <a:cs typeface="+mj-cs"/>
+              </a:rPr>
+              <a:t>EV Registrations Over Time</a:t>
+            </a:r>
+            <a:br>
+              <a:rPr lang="en-US" sz="2000" kern="1200">
+                <a:solidFill>
+                  <a:schemeClr val="tx1"/>
+                </a:solidFill>
+                <a:latin typeface="+mj-lt"/>
+                <a:ea typeface="+mj-ea"/>
+                <a:cs typeface="+mj-cs"/>
+              </a:rPr>
+            </a:br>
+            <a:r>
+              <a:rPr lang="en-US" sz="2000" kern="1200">
+                <a:solidFill>
+                  <a:schemeClr val="tx1"/>
+                </a:solidFill>
+                <a:latin typeface="+mj-lt"/>
+                <a:ea typeface="+mj-ea"/>
+                <a:cs typeface="+mj-cs"/>
+              </a:rPr>
+              <a:t>Strong growth after 2015</a:t>
+            </a:r>
+            <a:br>
+              <a:rPr lang="en-US" sz="2000" kern="1200">
+                <a:solidFill>
+                  <a:schemeClr val="tx1"/>
+                </a:solidFill>
+                <a:latin typeface="+mj-lt"/>
+                <a:ea typeface="+mj-ea"/>
+                <a:cs typeface="+mj-cs"/>
+              </a:rPr>
+            </a:br>
+            <a:r>
+              <a:rPr lang="en-US" sz="2000" kern="1200">
+                <a:solidFill>
+                  <a:schemeClr val="tx1"/>
+                </a:solidFill>
+                <a:latin typeface="+mj-lt"/>
+                <a:ea typeface="+mj-ea"/>
+                <a:cs typeface="+mj-cs"/>
+              </a:rPr>
+              <a:t>Peak around 2022</a:t>
+            </a:r>
+            <a:br>
+              <a:rPr lang="en-US" sz="2000" kern="1200">
+                <a:solidFill>
+                  <a:schemeClr val="tx1"/>
+                </a:solidFill>
+                <a:latin typeface="+mj-lt"/>
+                <a:ea typeface="+mj-ea"/>
+                <a:cs typeface="+mj-cs"/>
+              </a:rPr>
+            </a:br>
+            <a:r>
+              <a:rPr lang="en-US" sz="2000" kern="1200">
+                <a:solidFill>
+                  <a:schemeClr val="tx1"/>
+                </a:solidFill>
+                <a:latin typeface="+mj-lt"/>
+                <a:ea typeface="+mj-ea"/>
+                <a:cs typeface="+mj-cs"/>
+              </a:rPr>
+              <a:t>Clear upward trend showing rapid EV adoption</a:t>
+            </a:r>
+            <a:br>
+              <a:rPr lang="en-US" sz="2000" kern="1200">
+                <a:solidFill>
+                  <a:schemeClr val="tx1"/>
+                </a:solidFill>
+                <a:latin typeface="+mj-lt"/>
+                <a:ea typeface="+mj-ea"/>
+                <a:cs typeface="+mj-cs"/>
+              </a:rPr>
+            </a:br>
+            <a:endParaRPr lang="en-US" sz="2000" kern="1200">
+              <a:solidFill>
+                <a:schemeClr val="tx1"/>
+              </a:solidFill>
+              <a:latin typeface="+mj-lt"/>
+              <a:ea typeface="+mj-ea"/>
+              <a:cs typeface="+mj-cs"/>
+            </a:endParaRPr>
+          </a:p>
+        </p:txBody>
+      </p:sp>
     </p:spTree>
   </p:cSld>
   <p:clrMapOvr>
@@ -3205,34 +4141,88 @@
 </p:sld>
 </file>
 
-<file path=ppt/slides/slide3.xml><?xml version="1.0" encoding="utf-8"?>
-<p:sld xmlns:a="http://schemas.openxmlformats.org/drawingml/2006/main" xmlns:p="http://schemas.openxmlformats.org/presentationml/2006/main" xmlns:r="http://schemas.openxmlformats.org/officeDocument/2006/relationships">
+<file path=ppt/slides/slide4.xml><?xml version="1.0" encoding="utf-8"?>
+<p:sld xmlns:a="http://schemas.openxmlformats.org/drawingml/2006/main" xmlns:r="http://schemas.openxmlformats.org/officeDocument/2006/relationships" xmlns:p="http://schemas.openxmlformats.org/presentationml/2006/main">
   <p:cSld>
+    <p:bg>
+      <p:bgPr>
+        <a:solidFill>
+          <a:schemeClr val="bg1"/>
+        </a:solidFill>
+        <a:effectLst/>
+      </p:bgPr>
+    </p:bg>
     <p:spTree>
       <p:nvGrpSpPr>
         <p:cNvPr id="1" name=""/>
         <p:cNvGrpSpPr/>
         <p:nvPr/>
       </p:nvGrpSpPr>
-      <p:grpSpPr/>
-      <p:sp>
-        <p:nvSpPr>
-          <p:cNvPr id="2" name="Title 1"/>
-          <p:cNvSpPr>
-            <a:spLocks noGrp="1"/>
-          </p:cNvSpPr>
-          <p:nvPr>
-            <p:ph type="title"/>
-          </p:nvPr>
-        </p:nvSpPr>
-        <p:spPr/>
-        <p:txBody>
-          <a:bodyPr/>
-          <a:lstStyle/>
-          <a:p>
-            <a:r>
-              <a:t>Top 10 EV Brands</a:t>
-            </a:r>
+      <p:grpSpPr>
+        <a:xfrm>
+          <a:off x="0" y="0"/>
+          <a:ext cx="0" cy="0"/>
+          <a:chOff x="0" y="0"/>
+          <a:chExt cx="0" cy="0"/>
+        </a:xfrm>
+      </p:grpSpPr>
+      <p:sp useBgFill="1">
+        <p:nvSpPr>
+          <p:cNvPr id="8" name="Rectangle 7">
+            <a:extLst>
+              <a:ext uri="{FF2B5EF4-FFF2-40B4-BE49-F238E27FC236}">
+                <a16:creationId xmlns:a16="http://schemas.microsoft.com/office/drawing/2014/main" id="{B9D7E975-9161-4F2D-AC53-69E1912F6B5D}"/>
+              </a:ext>
+              <a:ext uri="{C183D7F6-B498-43B3-948B-1728B52AA6E4}">
+                <adec:decorative xmlns:adec="http://schemas.microsoft.com/office/drawing/2017/decorative" val="1"/>
+              </a:ext>
+            </a:extLst>
+          </p:cNvPr>
+          <p:cNvSpPr>
+            <a:spLocks noGrp="1" noRot="1" noChangeAspect="1" noMove="1" noResize="1" noEditPoints="1" noAdjustHandles="1" noChangeArrowheads="1" noChangeShapeType="1" noTextEdit="1"/>
+          </p:cNvSpPr>
+          <p:nvPr>
+            <p:extLst>
+              <p:ext uri="{386F3935-93C4-4BCD-93E2-E3B085C9AB24}">
+                <p16:designElem xmlns:p16="http://schemas.microsoft.com/office/powerpoint/2015/main" val="1"/>
+              </p:ext>
+            </p:extLst>
+          </p:nvPr>
+        </p:nvSpPr>
+        <p:spPr>
+          <a:xfrm>
+            <a:off x="0" y="0"/>
+            <a:ext cx="9144000" cy="6858000"/>
+          </a:xfrm>
+          <a:prstGeom prst="rect">
+            <a:avLst/>
+          </a:prstGeom>
+          <a:ln>
+            <a:noFill/>
+          </a:ln>
+        </p:spPr>
+        <p:style>
+          <a:lnRef idx="2">
+            <a:schemeClr val="accent1">
+              <a:shade val="50000"/>
+            </a:schemeClr>
+          </a:lnRef>
+          <a:fillRef idx="1">
+            <a:schemeClr val="accent1"/>
+          </a:fillRef>
+          <a:effectRef idx="0">
+            <a:schemeClr val="accent1"/>
+          </a:effectRef>
+          <a:fontRef idx="minor">
+            <a:schemeClr val="lt1"/>
+          </a:fontRef>
+        </p:style>
+        <p:txBody>
+          <a:bodyPr rtlCol="0" anchor="ctr"/>
+          <a:lstStyle/>
+          <a:p>
+            <a:pPr algn="ctr"/>
+            <a:endParaRPr lang="en-US"/>
           </a:p>
         </p:txBody>
       </p:sp>
@@ -3252,14 +4242,254 @@
         </p:blipFill>
         <p:spPr>
           <a:xfrm>
-            <a:off x="914400" y="1371600"/>
-            <a:ext cx="7315200" cy="6432965"/>
+            <a:off x="466256" y="1252669"/>
+            <a:ext cx="4942153" cy="4349094"/>
           </a:xfrm>
           <a:prstGeom prst="rect">
             <a:avLst/>
           </a:prstGeom>
         </p:spPr>
       </p:pic>
+      <p:sp>
+        <p:nvSpPr>
+          <p:cNvPr id="10" name="Right Triangle 9">
+            <a:extLst>
+              <a:ext uri="{FF2B5EF4-FFF2-40B4-BE49-F238E27FC236}">
+                <a16:creationId xmlns:a16="http://schemas.microsoft.com/office/drawing/2014/main" id="{827DC2C4-B485-428A-BF4A-472D2967F47F}"/>
+              </a:ext>
+              <a:ext uri="{C183D7F6-B498-43B3-948B-1728B52AA6E4}">
+                <adec:decorative xmlns:adec="http://schemas.microsoft.com/office/drawing/2017/decorative" val="1"/>
+              </a:ext>
+            </a:extLst>
+          </p:cNvPr>
+          <p:cNvSpPr>
+            <a:spLocks noGrp="1" noRot="1" noChangeAspect="1" noMove="1" noResize="1" noEditPoints="1" noAdjustHandles="1" noChangeArrowheads="1" noChangeShapeType="1" noTextEdit="1"/>
+          </p:cNvSpPr>
+          <p:nvPr>
+            <p:extLst>
+              <p:ext uri="{386F3935-93C4-4BCD-93E2-E3B085C9AB24}">
+                <p16:designElem xmlns:p16="http://schemas.microsoft.com/office/powerpoint/2015/main" val="1"/>
+              </p:ext>
+            </p:extLst>
+          </p:nvPr>
+        </p:nvSpPr>
+        <p:spPr>
+          <a:xfrm flipH="1">
+            <a:off x="6432540" y="3335867"/>
+            <a:ext cx="2468880" cy="3200400"/>
+          </a:xfrm>
+          <a:prstGeom prst="rtTriangle">
+            <a:avLst/>
+          </a:prstGeom>
+          <a:solidFill>
+            <a:schemeClr val="accent4"/>
+          </a:solidFill>
+          <a:ln>
+            <a:noFill/>
+          </a:ln>
+        </p:spPr>
+        <p:style>
+          <a:lnRef idx="2">
+            <a:schemeClr val="accent1">
+              <a:shade val="50000"/>
+            </a:schemeClr>
+          </a:lnRef>
+          <a:fillRef idx="1">
+            <a:schemeClr val="accent1"/>
+          </a:fillRef>
+          <a:effectRef idx="0">
+            <a:schemeClr val="accent1"/>
+          </a:effectRef>
+          <a:fontRef idx="minor">
+            <a:schemeClr val="lt1"/>
+          </a:fontRef>
+        </p:style>
+        <p:txBody>
+          <a:bodyPr rtlCol="0" anchor="ctr"/>
+          <a:lstStyle/>
+          <a:p>
+            <a:pPr algn="ctr"/>
+            <a:endParaRPr lang="en-US" dirty="0"/>
+          </a:p>
+        </p:txBody>
+      </p:sp>
+      <p:sp>
+        <p:nvSpPr>
+          <p:cNvPr id="12" name="Rectangle 11">
+            <a:extLst>
+              <a:ext uri="{FF2B5EF4-FFF2-40B4-BE49-F238E27FC236}">
+                <a16:creationId xmlns:a16="http://schemas.microsoft.com/office/drawing/2014/main" id="{463E6235-1649-4B47-9862-4026FC473B6F}"/>
+              </a:ext>
+              <a:ext uri="{C183D7F6-B498-43B3-948B-1728B52AA6E4}">
+                <adec:decorative xmlns:adec="http://schemas.microsoft.com/office/drawing/2017/decorative" val="1"/>
+              </a:ext>
+            </a:extLst>
+          </p:cNvPr>
+          <p:cNvSpPr>
+            <a:spLocks noGrp="1" noRot="1" noChangeAspect="1" noMove="1" noResize="1" noEditPoints="1" noAdjustHandles="1" noChangeArrowheads="1" noChangeShapeType="1" noTextEdit="1"/>
+          </p:cNvSpPr>
+          <p:nvPr>
+            <p:extLst>
+              <p:ext uri="{386F3935-93C4-4BCD-93E2-E3B085C9AB24}">
+                <p16:designElem xmlns:p16="http://schemas.microsoft.com/office/powerpoint/2015/main" val="1"/>
+              </p:ext>
+            </p:extLst>
+          </p:nvPr>
+        </p:nvSpPr>
+        <p:spPr>
+          <a:xfrm>
+            <a:off x="5650989" y="623275"/>
+            <a:ext cx="3009130" cy="5607882"/>
+          </a:xfrm>
+          <a:prstGeom prst="rect">
+            <a:avLst/>
+          </a:prstGeom>
+          <a:noFill/>
+          <a:ln w="19050">
+            <a:solidFill>
+              <a:schemeClr val="tx1">
+                <a:lumMod val="75000"/>
+                <a:lumOff val="25000"/>
+              </a:schemeClr>
+            </a:solidFill>
+          </a:ln>
+        </p:spPr>
+        <p:style>
+          <a:lnRef idx="2">
+            <a:schemeClr val="accent1">
+              <a:shade val="50000"/>
+            </a:schemeClr>
+          </a:lnRef>
+          <a:fillRef idx="1">
+            <a:schemeClr val="accent1"/>
+          </a:fillRef>
+          <a:effectRef idx="0">
+            <a:schemeClr val="accent1"/>
+          </a:effectRef>
+          <a:fontRef idx="minor">
+            <a:schemeClr val="lt1"/>
+          </a:fontRef>
+        </p:style>
+        <p:txBody>
+          <a:bodyPr rtlCol="0" anchor="ctr"/>
+          <a:lstStyle/>
+          <a:p>
+            <a:pPr algn="ctr"/>
+            <a:endParaRPr lang="en-US"/>
+          </a:p>
+        </p:txBody>
+      </p:sp>
+      <p:sp>
+        <p:nvSpPr>
+          <p:cNvPr id="2" name="Title 1"/>
+          <p:cNvSpPr>
+            <a:spLocks noGrp="1"/>
+          </p:cNvSpPr>
+          <p:nvPr>
+            <p:ph type="title"/>
+          </p:nvPr>
+        </p:nvSpPr>
+        <p:spPr>
+          <a:xfrm>
+            <a:off x="6039372" y="1056640"/>
+            <a:ext cx="2398245" cy="3125746"/>
+          </a:xfrm>
+        </p:spPr>
+        <p:txBody>
+          <a:bodyPr vert="horz" lIns="91440" tIns="45720" rIns="91440" bIns="45720" rtlCol="0" anchor="b">
+            <a:normAutofit/>
+          </a:bodyPr>
+          <a:lstStyle/>
+          <a:p>
+            <a:pPr algn="l" defTabSz="914400">
+              <a:lnSpc>
+                <a:spcPct val="90000"/>
+              </a:lnSpc>
+            </a:pPr>
+            <a:br>
+              <a:rPr lang="en-US" sz="2000" kern="1200" dirty="0">
+                <a:solidFill>
+                  <a:schemeClr val="tx1"/>
+                </a:solidFill>
+                <a:latin typeface="+mj-lt"/>
+                <a:ea typeface="+mj-ea"/>
+                <a:cs typeface="+mj-cs"/>
+              </a:rPr>
+            </a:br>
+            <a:r>
+              <a:rPr lang="en-US" sz="2000" kern="1200" dirty="0">
+                <a:solidFill>
+                  <a:schemeClr val="tx1"/>
+                </a:solidFill>
+                <a:latin typeface="+mj-lt"/>
+                <a:ea typeface="+mj-ea"/>
+                <a:cs typeface="+mj-cs"/>
+              </a:rPr>
+              <a:t>Tesla dominates with a large share</a:t>
+            </a:r>
+            <a:br>
+              <a:rPr lang="en-US" sz="2000" kern="1200" dirty="0">
+                <a:solidFill>
+                  <a:schemeClr val="tx1"/>
+                </a:solidFill>
+                <a:latin typeface="+mj-lt"/>
+                <a:ea typeface="+mj-ea"/>
+                <a:cs typeface="+mj-cs"/>
+              </a:rPr>
+            </a:br>
+            <a:r>
+              <a:rPr lang="en-US" sz="2000" kern="1200" dirty="0">
+                <a:solidFill>
+                  <a:schemeClr val="tx1"/>
+                </a:solidFill>
+                <a:latin typeface="+mj-lt"/>
+                <a:ea typeface="+mj-ea"/>
+                <a:cs typeface="+mj-cs"/>
+              </a:rPr>
+              <a:t>Nissan and Chevrolet follow, but much smaller</a:t>
+            </a:r>
+            <a:br>
+              <a:rPr lang="en-US" sz="2000" kern="1200" dirty="0">
+                <a:solidFill>
+                  <a:schemeClr val="tx1"/>
+                </a:solidFill>
+                <a:latin typeface="+mj-lt"/>
+                <a:ea typeface="+mj-ea"/>
+                <a:cs typeface="+mj-cs"/>
+              </a:rPr>
+            </a:br>
+            <a:r>
+              <a:rPr lang="en-US" sz="2000" kern="1200" dirty="0">
+                <a:solidFill>
+                  <a:schemeClr val="tx1"/>
+                </a:solidFill>
+                <a:latin typeface="+mj-lt"/>
+                <a:ea typeface="+mj-ea"/>
+                <a:cs typeface="+mj-cs"/>
+              </a:rPr>
+              <a:t>Ford, BMW, Kia also appear in the top list</a:t>
+            </a:r>
+            <a:br>
+              <a:rPr lang="en-US" sz="2000" kern="1200" dirty="0">
+                <a:solidFill>
+                  <a:schemeClr val="tx1"/>
+                </a:solidFill>
+                <a:latin typeface="+mj-lt"/>
+                <a:ea typeface="+mj-ea"/>
+                <a:cs typeface="+mj-cs"/>
+              </a:rPr>
+            </a:br>
+            <a:endParaRPr lang="en-US" sz="2000" kern="1200" dirty="0">
+              <a:solidFill>
+                <a:schemeClr val="tx1"/>
+              </a:solidFill>
+              <a:latin typeface="+mj-lt"/>
+              <a:ea typeface="+mj-ea"/>
+              <a:cs typeface="+mj-cs"/>
+            </a:endParaRPr>
+          </a:p>
+        </p:txBody>
+      </p:sp>
     </p:spTree>
   </p:cSld>
   <p:clrMapOvr>
@@ -3268,34 +4498,88 @@
 </p:sld>
 </file>
 
-<file path=ppt/slides/slide4.xml><?xml version="1.0" encoding="utf-8"?>
-<p:sld xmlns:a="http://schemas.openxmlformats.org/drawingml/2006/main" xmlns:p="http://schemas.openxmlformats.org/presentationml/2006/main" xmlns:r="http://schemas.openxmlformats.org/officeDocument/2006/relationships">
+<file path=ppt/slides/slide5.xml><?xml version="1.0" encoding="utf-8"?>
+<p:sld xmlns:a="http://schemas.openxmlformats.org/drawingml/2006/main" xmlns:r="http://schemas.openxmlformats.org/officeDocument/2006/relationships" xmlns:p="http://schemas.openxmlformats.org/presentationml/2006/main">
   <p:cSld>
+    <p:bg>
+      <p:bgPr>
+        <a:solidFill>
+          <a:schemeClr val="bg1"/>
+        </a:solidFill>
+        <a:effectLst/>
+      </p:bgPr>
+    </p:bg>
     <p:spTree>
       <p:nvGrpSpPr>
         <p:cNvPr id="1" name=""/>
         <p:cNvGrpSpPr/>
         <p:nvPr/>
       </p:nvGrpSpPr>
-      <p:grpSpPr/>
-      <p:sp>
-        <p:nvSpPr>
-          <p:cNvPr id="2" name="Title 1"/>
-          <p:cNvSpPr>
-            <a:spLocks noGrp="1"/>
-          </p:cNvSpPr>
-          <p:nvPr>
-            <p:ph type="title"/>
-          </p:nvPr>
-        </p:nvSpPr>
-        <p:spPr/>
-        <p:txBody>
-          <a:bodyPr/>
-          <a:lstStyle/>
-          <a:p>
-            <a:r>
-              <a:t>EV Types: BEV vs PHEV</a:t>
-            </a:r>
+      <p:grpSpPr>
+        <a:xfrm>
+          <a:off x="0" y="0"/>
+          <a:ext cx="0" cy="0"/>
+          <a:chOff x="0" y="0"/>
+          <a:chExt cx="0" cy="0"/>
+        </a:xfrm>
+      </p:grpSpPr>
+      <p:sp useBgFill="1">
+        <p:nvSpPr>
+          <p:cNvPr id="8" name="Rectangle 7">
+            <a:extLst>
+              <a:ext uri="{FF2B5EF4-FFF2-40B4-BE49-F238E27FC236}">
+                <a16:creationId xmlns:a16="http://schemas.microsoft.com/office/drawing/2014/main" id="{B9D7E975-9161-4F2D-AC53-69E1912F6B5D}"/>
+              </a:ext>
+              <a:ext uri="{C183D7F6-B498-43B3-948B-1728B52AA6E4}">
+                <adec:decorative xmlns:adec="http://schemas.microsoft.com/office/drawing/2017/decorative" val="1"/>
+              </a:ext>
+            </a:extLst>
+          </p:cNvPr>
+          <p:cNvSpPr>
+            <a:spLocks noGrp="1" noRot="1" noChangeAspect="1" noMove="1" noResize="1" noEditPoints="1" noAdjustHandles="1" noChangeArrowheads="1" noChangeShapeType="1" noTextEdit="1"/>
+          </p:cNvSpPr>
+          <p:nvPr>
+            <p:extLst>
+              <p:ext uri="{386F3935-93C4-4BCD-93E2-E3B085C9AB24}">
+                <p16:designElem xmlns:p16="http://schemas.microsoft.com/office/powerpoint/2015/main" val="1"/>
+              </p:ext>
+            </p:extLst>
+          </p:nvPr>
+        </p:nvSpPr>
+        <p:spPr>
+          <a:xfrm>
+            <a:off x="0" y="0"/>
+            <a:ext cx="9144000" cy="6858000"/>
+          </a:xfrm>
+          <a:prstGeom prst="rect">
+            <a:avLst/>
+          </a:prstGeom>
+          <a:ln>
+            <a:noFill/>
+          </a:ln>
+        </p:spPr>
+        <p:style>
+          <a:lnRef idx="2">
+            <a:schemeClr val="accent1">
+              <a:shade val="50000"/>
+            </a:schemeClr>
+          </a:lnRef>
+          <a:fillRef idx="1">
+            <a:schemeClr val="accent1"/>
+          </a:fillRef>
+          <a:effectRef idx="0">
+            <a:schemeClr val="accent1"/>
+          </a:effectRef>
+          <a:fontRef idx="minor">
+            <a:schemeClr val="lt1"/>
+          </a:fontRef>
+        </p:style>
+        <p:txBody>
+          <a:bodyPr rtlCol="0" anchor="ctr"/>
+          <a:lstStyle/>
+          <a:p>
+            <a:pPr algn="ctr"/>
+            <a:endParaRPr lang="en-US"/>
           </a:p>
         </p:txBody>
       </p:sp>
@@ -3315,14 +4599,231 @@
         </p:blipFill>
         <p:spPr>
           <a:xfrm>
-            <a:off x="914400" y="1371600"/>
-            <a:ext cx="7315200" cy="4434435"/>
+            <a:off x="466256" y="1932215"/>
+            <a:ext cx="4942153" cy="2990002"/>
           </a:xfrm>
           <a:prstGeom prst="rect">
             <a:avLst/>
           </a:prstGeom>
         </p:spPr>
       </p:pic>
+      <p:sp>
+        <p:nvSpPr>
+          <p:cNvPr id="10" name="Right Triangle 9">
+            <a:extLst>
+              <a:ext uri="{FF2B5EF4-FFF2-40B4-BE49-F238E27FC236}">
+                <a16:creationId xmlns:a16="http://schemas.microsoft.com/office/drawing/2014/main" id="{827DC2C4-B485-428A-BF4A-472D2967F47F}"/>
+              </a:ext>
+              <a:ext uri="{C183D7F6-B498-43B3-948B-1728B52AA6E4}">
+                <adec:decorative xmlns:adec="http://schemas.microsoft.com/office/drawing/2017/decorative" val="1"/>
+              </a:ext>
+            </a:extLst>
+          </p:cNvPr>
+          <p:cNvSpPr>
+            <a:spLocks noGrp="1" noRot="1" noChangeAspect="1" noMove="1" noResize="1" noEditPoints="1" noAdjustHandles="1" noChangeArrowheads="1" noChangeShapeType="1" noTextEdit="1"/>
+          </p:cNvSpPr>
+          <p:nvPr>
+            <p:extLst>
+              <p:ext uri="{386F3935-93C4-4BCD-93E2-E3B085C9AB24}">
+                <p16:designElem xmlns:p16="http://schemas.microsoft.com/office/powerpoint/2015/main" val="1"/>
+              </p:ext>
+            </p:extLst>
+          </p:nvPr>
+        </p:nvSpPr>
+        <p:spPr>
+          <a:xfrm flipH="1">
+            <a:off x="6432540" y="3335867"/>
+            <a:ext cx="2468880" cy="3200400"/>
+          </a:xfrm>
+          <a:prstGeom prst="rtTriangle">
+            <a:avLst/>
+          </a:prstGeom>
+          <a:solidFill>
+            <a:schemeClr val="accent4"/>
+          </a:solidFill>
+          <a:ln>
+            <a:noFill/>
+          </a:ln>
+        </p:spPr>
+        <p:style>
+          <a:lnRef idx="2">
+            <a:schemeClr val="accent1">
+              <a:shade val="50000"/>
+            </a:schemeClr>
+          </a:lnRef>
+          <a:fillRef idx="1">
+            <a:schemeClr val="accent1"/>
+          </a:fillRef>
+          <a:effectRef idx="0">
+            <a:schemeClr val="accent1"/>
+          </a:effectRef>
+          <a:fontRef idx="minor">
+            <a:schemeClr val="lt1"/>
+          </a:fontRef>
+        </p:style>
+        <p:txBody>
+          <a:bodyPr rtlCol="0" anchor="ctr"/>
+          <a:lstStyle/>
+          <a:p>
+            <a:pPr algn="ctr"/>
+            <a:endParaRPr lang="en-US" dirty="0"/>
+          </a:p>
+        </p:txBody>
+      </p:sp>
+      <p:sp>
+        <p:nvSpPr>
+          <p:cNvPr id="12" name="Rectangle 11">
+            <a:extLst>
+              <a:ext uri="{FF2B5EF4-FFF2-40B4-BE49-F238E27FC236}">
+                <a16:creationId xmlns:a16="http://schemas.microsoft.com/office/drawing/2014/main" id="{463E6235-1649-4B47-9862-4026FC473B6F}"/>
+              </a:ext>
+              <a:ext uri="{C183D7F6-B498-43B3-948B-1728B52AA6E4}">
+                <adec:decorative xmlns:adec="http://schemas.microsoft.com/office/drawing/2017/decorative" val="1"/>
+              </a:ext>
+            </a:extLst>
+          </p:cNvPr>
+          <p:cNvSpPr>
+            <a:spLocks noGrp="1" noRot="1" noChangeAspect="1" noMove="1" noResize="1" noEditPoints="1" noAdjustHandles="1" noChangeArrowheads="1" noChangeShapeType="1" noTextEdit="1"/>
+          </p:cNvSpPr>
+          <p:nvPr>
+            <p:extLst>
+              <p:ext uri="{386F3935-93C4-4BCD-93E2-E3B085C9AB24}">
+                <p16:designElem xmlns:p16="http://schemas.microsoft.com/office/powerpoint/2015/main" val="1"/>
+              </p:ext>
+            </p:extLst>
+          </p:nvPr>
+        </p:nvSpPr>
+        <p:spPr>
+          <a:xfrm>
+            <a:off x="5650989" y="623275"/>
+            <a:ext cx="3009130" cy="5607882"/>
+          </a:xfrm>
+          <a:prstGeom prst="rect">
+            <a:avLst/>
+          </a:prstGeom>
+          <a:noFill/>
+          <a:ln w="19050">
+            <a:solidFill>
+              <a:schemeClr val="tx1">
+                <a:lumMod val="75000"/>
+                <a:lumOff val="25000"/>
+              </a:schemeClr>
+            </a:solidFill>
+          </a:ln>
+        </p:spPr>
+        <p:style>
+          <a:lnRef idx="2">
+            <a:schemeClr val="accent1">
+              <a:shade val="50000"/>
+            </a:schemeClr>
+          </a:lnRef>
+          <a:fillRef idx="1">
+            <a:schemeClr val="accent1"/>
+          </a:fillRef>
+          <a:effectRef idx="0">
+            <a:schemeClr val="accent1"/>
+          </a:effectRef>
+          <a:fontRef idx="minor">
+            <a:schemeClr val="lt1"/>
+          </a:fontRef>
+        </p:style>
+        <p:txBody>
+          <a:bodyPr rtlCol="0" anchor="ctr"/>
+          <a:lstStyle/>
+          <a:p>
+            <a:pPr algn="ctr"/>
+            <a:endParaRPr lang="en-US"/>
+          </a:p>
+        </p:txBody>
+      </p:sp>
+      <p:sp>
+        <p:nvSpPr>
+          <p:cNvPr id="2" name="Title 1"/>
+          <p:cNvSpPr>
+            <a:spLocks noGrp="1"/>
+          </p:cNvSpPr>
+          <p:nvPr>
+            <p:ph type="title"/>
+          </p:nvPr>
+        </p:nvSpPr>
+        <p:spPr>
+          <a:xfrm>
+            <a:off x="5788573" y="1081547"/>
+            <a:ext cx="2398245" cy="3588775"/>
+          </a:xfrm>
+        </p:spPr>
+        <p:txBody>
+          <a:bodyPr vert="horz" lIns="91440" tIns="45720" rIns="91440" bIns="45720" rtlCol="0" anchor="b">
+            <a:normAutofit fontScale="90000"/>
+          </a:bodyPr>
+          <a:lstStyle/>
+          <a:p>
+            <a:r>
+              <a:rPr lang="en-US" sz="2000" kern="1200" dirty="0">
+                <a:solidFill>
+                  <a:schemeClr val="tx1"/>
+                </a:solidFill>
+                <a:latin typeface="+mj-lt"/>
+                <a:ea typeface="+mj-ea"/>
+                <a:cs typeface="+mj-cs"/>
+              </a:rPr>
+              <a:t>BEV vs PHEV</a:t>
+            </a:r>
+            <a:br>
+              <a:rPr lang="en-US" sz="2000" kern="1200" dirty="0">
+                <a:solidFill>
+                  <a:schemeClr val="tx1"/>
+                </a:solidFill>
+                <a:latin typeface="+mj-lt"/>
+                <a:ea typeface="+mj-ea"/>
+                <a:cs typeface="+mj-cs"/>
+              </a:rPr>
+            </a:br>
+            <a:br>
+              <a:rPr lang="en-US" sz="2000" kern="1200" dirty="0">
+                <a:solidFill>
+                  <a:schemeClr val="tx1"/>
+                </a:solidFill>
+                <a:latin typeface="+mj-lt"/>
+                <a:ea typeface="+mj-ea"/>
+                <a:cs typeface="+mj-cs"/>
+              </a:rPr>
+            </a:br>
+            <a:br>
+              <a:rPr lang="en-US" sz="2000" dirty="0"/>
+            </a:br>
+            <a:r>
+              <a:rPr lang="en-US" sz="2000" dirty="0"/>
+              <a:t>Battery Electric Vehicles (BEVs) ≈ 80%</a:t>
+            </a:r>
+            <a:br>
+              <a:rPr lang="en-US" sz="2000" dirty="0"/>
+            </a:br>
+            <a:r>
+              <a:rPr lang="en-US" sz="2000" dirty="0"/>
+              <a:t>Plug-in Hybrids (PHEVs) ≈ 20%</a:t>
+            </a:r>
+            <a:br>
+              <a:rPr lang="en-US" sz="2000" dirty="0"/>
+            </a:br>
+            <a:r>
+              <a:rPr lang="en-US" sz="2000" dirty="0"/>
+              <a:t>Full electric cars clearly dominate the dataset</a:t>
+            </a:r>
+            <a:br>
+              <a:rPr lang="en-US" sz="2000" dirty="0"/>
+            </a:br>
+            <a:endParaRPr lang="en-US" sz="2000" kern="1200" dirty="0">
+              <a:solidFill>
+                <a:schemeClr val="tx1"/>
+              </a:solidFill>
+              <a:latin typeface="+mj-lt"/>
+              <a:ea typeface="+mj-ea"/>
+              <a:cs typeface="+mj-cs"/>
+            </a:endParaRPr>
+          </a:p>
+        </p:txBody>
+      </p:sp>
     </p:spTree>
   </p:cSld>
   <p:clrMapOvr>
@@ -3331,34 +4832,88 @@
 </p:sld>
 </file>
 
-<file path=ppt/slides/slide5.xml><?xml version="1.0" encoding="utf-8"?>
-<p:sld xmlns:a="http://schemas.openxmlformats.org/drawingml/2006/main" xmlns:p="http://schemas.openxmlformats.org/presentationml/2006/main" xmlns:r="http://schemas.openxmlformats.org/officeDocument/2006/relationships">
+<file path=ppt/slides/slide6.xml><?xml version="1.0" encoding="utf-8"?>
+<p:sld xmlns:a="http://schemas.openxmlformats.org/drawingml/2006/main" xmlns:r="http://schemas.openxmlformats.org/officeDocument/2006/relationships" xmlns:p="http://schemas.openxmlformats.org/presentationml/2006/main">
   <p:cSld>
+    <p:bg>
+      <p:bgPr>
+        <a:solidFill>
+          <a:schemeClr val="bg1"/>
+        </a:solidFill>
+        <a:effectLst/>
+      </p:bgPr>
+    </p:bg>
     <p:spTree>
       <p:nvGrpSpPr>
         <p:cNvPr id="1" name=""/>
         <p:cNvGrpSpPr/>
         <p:nvPr/>
       </p:nvGrpSpPr>
-      <p:grpSpPr/>
-      <p:sp>
-        <p:nvSpPr>
-          <p:cNvPr id="2" name="Title 1"/>
-          <p:cNvSpPr>
-            <a:spLocks noGrp="1"/>
-          </p:cNvSpPr>
-          <p:nvPr>
-            <p:ph type="title"/>
-          </p:nvPr>
-        </p:nvSpPr>
-        <p:spPr/>
-        <p:txBody>
-          <a:bodyPr/>
-          <a:lstStyle/>
-          <a:p>
-            <a:r>
-              <a:t>Electric Range vs Base MSRP</a:t>
-            </a:r>
+      <p:grpSpPr>
+        <a:xfrm>
+          <a:off x="0" y="0"/>
+          <a:ext cx="0" cy="0"/>
+          <a:chOff x="0" y="0"/>
+          <a:chExt cx="0" cy="0"/>
+        </a:xfrm>
+      </p:grpSpPr>
+      <p:sp useBgFill="1">
+        <p:nvSpPr>
+          <p:cNvPr id="28" name="Rectangle 27">
+            <a:extLst>
+              <a:ext uri="{FF2B5EF4-FFF2-40B4-BE49-F238E27FC236}">
+                <a16:creationId xmlns:a16="http://schemas.microsoft.com/office/drawing/2014/main" id="{B9D7E975-9161-4F2D-AC53-69E1912F6B5D}"/>
+              </a:ext>
+              <a:ext uri="{C183D7F6-B498-43B3-948B-1728B52AA6E4}">
+                <adec:decorative xmlns:adec="http://schemas.microsoft.com/office/drawing/2017/decorative" val="1"/>
+              </a:ext>
+            </a:extLst>
+          </p:cNvPr>
+          <p:cNvSpPr>
+            <a:spLocks noGrp="1" noRot="1" noChangeAspect="1" noMove="1" noResize="1" noEditPoints="1" noAdjustHandles="1" noChangeArrowheads="1" noChangeShapeType="1" noTextEdit="1"/>
+          </p:cNvSpPr>
+          <p:nvPr>
+            <p:extLst>
+              <p:ext uri="{386F3935-93C4-4BCD-93E2-E3B085C9AB24}">
+                <p16:designElem xmlns:p16="http://schemas.microsoft.com/office/powerpoint/2015/main" val="1"/>
+              </p:ext>
+            </p:extLst>
+          </p:nvPr>
+        </p:nvSpPr>
+        <p:spPr>
+          <a:xfrm>
+            <a:off x="0" y="0"/>
+            <a:ext cx="9144000" cy="6858000"/>
+          </a:xfrm>
+          <a:prstGeom prst="rect">
+            <a:avLst/>
+          </a:prstGeom>
+          <a:ln>
+            <a:noFill/>
+          </a:ln>
+        </p:spPr>
+        <p:style>
+          <a:lnRef idx="2">
+            <a:schemeClr val="accent1">
+              <a:shade val="50000"/>
+            </a:schemeClr>
+          </a:lnRef>
+          <a:fillRef idx="1">
+            <a:schemeClr val="accent1"/>
+          </a:fillRef>
+          <a:effectRef idx="0">
+            <a:schemeClr val="accent1"/>
+          </a:effectRef>
+          <a:fontRef idx="minor">
+            <a:schemeClr val="lt1"/>
+          </a:fontRef>
+        </p:style>
+        <p:txBody>
+          <a:bodyPr rtlCol="0" anchor="ctr"/>
+          <a:lstStyle/>
+          <a:p>
+            <a:pPr algn="ctr"/>
+            <a:endParaRPr lang="en-US"/>
           </a:p>
         </p:txBody>
       </p:sp>
@@ -3378,15 +4933,1019 @@
         </p:blipFill>
         <p:spPr>
           <a:xfrm>
-            <a:off x="914400" y="1371600"/>
-            <a:ext cx="7315200" cy="5575236"/>
+            <a:off x="466256" y="1543020"/>
+            <a:ext cx="4942153" cy="3768392"/>
           </a:xfrm>
           <a:prstGeom prst="rect">
             <a:avLst/>
           </a:prstGeom>
         </p:spPr>
       </p:pic>
+      <p:sp>
+        <p:nvSpPr>
+          <p:cNvPr id="30" name="Right Triangle 29">
+            <a:extLst>
+              <a:ext uri="{FF2B5EF4-FFF2-40B4-BE49-F238E27FC236}">
+                <a16:creationId xmlns:a16="http://schemas.microsoft.com/office/drawing/2014/main" id="{827DC2C4-B485-428A-BF4A-472D2967F47F}"/>
+              </a:ext>
+              <a:ext uri="{C183D7F6-B498-43B3-948B-1728B52AA6E4}">
+                <adec:decorative xmlns:adec="http://schemas.microsoft.com/office/drawing/2017/decorative" val="1"/>
+              </a:ext>
+            </a:extLst>
+          </p:cNvPr>
+          <p:cNvSpPr>
+            <a:spLocks noGrp="1" noRot="1" noChangeAspect="1" noMove="1" noResize="1" noEditPoints="1" noAdjustHandles="1" noChangeArrowheads="1" noChangeShapeType="1" noTextEdit="1"/>
+          </p:cNvSpPr>
+          <p:nvPr>
+            <p:extLst>
+              <p:ext uri="{386F3935-93C4-4BCD-93E2-E3B085C9AB24}">
+                <p16:designElem xmlns:p16="http://schemas.microsoft.com/office/powerpoint/2015/main" val="1"/>
+              </p:ext>
+            </p:extLst>
+          </p:nvPr>
+        </p:nvSpPr>
+        <p:spPr>
+          <a:xfrm flipH="1">
+            <a:off x="6432540" y="3335867"/>
+            <a:ext cx="2468880" cy="3200400"/>
+          </a:xfrm>
+          <a:prstGeom prst="rtTriangle">
+            <a:avLst/>
+          </a:prstGeom>
+          <a:solidFill>
+            <a:schemeClr val="accent4"/>
+          </a:solidFill>
+          <a:ln>
+            <a:noFill/>
+          </a:ln>
+        </p:spPr>
+        <p:style>
+          <a:lnRef idx="2">
+            <a:schemeClr val="accent1">
+              <a:shade val="50000"/>
+            </a:schemeClr>
+          </a:lnRef>
+          <a:fillRef idx="1">
+            <a:schemeClr val="accent1"/>
+          </a:fillRef>
+          <a:effectRef idx="0">
+            <a:schemeClr val="accent1"/>
+          </a:effectRef>
+          <a:fontRef idx="minor">
+            <a:schemeClr val="lt1"/>
+          </a:fontRef>
+        </p:style>
+        <p:txBody>
+          <a:bodyPr rtlCol="0" anchor="ctr"/>
+          <a:lstStyle/>
+          <a:p>
+            <a:pPr algn="ctr"/>
+            <a:endParaRPr lang="en-US" dirty="0"/>
+          </a:p>
+        </p:txBody>
+      </p:sp>
+      <p:sp>
+        <p:nvSpPr>
+          <p:cNvPr id="32" name="Rectangle 31">
+            <a:extLst>
+              <a:ext uri="{FF2B5EF4-FFF2-40B4-BE49-F238E27FC236}">
+                <a16:creationId xmlns:a16="http://schemas.microsoft.com/office/drawing/2014/main" id="{463E6235-1649-4B47-9862-4026FC473B6F}"/>
+              </a:ext>
+              <a:ext uri="{C183D7F6-B498-43B3-948B-1728B52AA6E4}">
+                <adec:decorative xmlns:adec="http://schemas.microsoft.com/office/drawing/2017/decorative" val="1"/>
+              </a:ext>
+            </a:extLst>
+          </p:cNvPr>
+          <p:cNvSpPr>
+            <a:spLocks noGrp="1" noRot="1" noChangeAspect="1" noMove="1" noResize="1" noEditPoints="1" noAdjustHandles="1" noChangeArrowheads="1" noChangeShapeType="1" noTextEdit="1"/>
+          </p:cNvSpPr>
+          <p:nvPr>
+            <p:extLst>
+              <p:ext uri="{386F3935-93C4-4BCD-93E2-E3B085C9AB24}">
+                <p16:designElem xmlns:p16="http://schemas.microsoft.com/office/powerpoint/2015/main" val="1"/>
+              </p:ext>
+            </p:extLst>
+          </p:nvPr>
+        </p:nvSpPr>
+        <p:spPr>
+          <a:xfrm>
+            <a:off x="5650989" y="623275"/>
+            <a:ext cx="3009130" cy="5607882"/>
+          </a:xfrm>
+          <a:prstGeom prst="rect">
+            <a:avLst/>
+          </a:prstGeom>
+          <a:noFill/>
+          <a:ln w="19050">
+            <a:solidFill>
+              <a:schemeClr val="tx1">
+                <a:lumMod val="75000"/>
+                <a:lumOff val="25000"/>
+              </a:schemeClr>
+            </a:solidFill>
+          </a:ln>
+        </p:spPr>
+        <p:style>
+          <a:lnRef idx="2">
+            <a:schemeClr val="accent1">
+              <a:shade val="50000"/>
+            </a:schemeClr>
+          </a:lnRef>
+          <a:fillRef idx="1">
+            <a:schemeClr val="accent1"/>
+          </a:fillRef>
+          <a:effectRef idx="0">
+            <a:schemeClr val="accent1"/>
+          </a:effectRef>
+          <a:fontRef idx="minor">
+            <a:schemeClr val="lt1"/>
+          </a:fontRef>
+        </p:style>
+        <p:txBody>
+          <a:bodyPr rtlCol="0" anchor="ctr"/>
+          <a:lstStyle/>
+          <a:p>
+            <a:pPr algn="ctr"/>
+            <a:endParaRPr lang="en-US"/>
+          </a:p>
+        </p:txBody>
+      </p:sp>
+      <p:sp>
+        <p:nvSpPr>
+          <p:cNvPr id="27" name="Rectangle 17">
+            <a:extLst>
+              <a:ext uri="{FF2B5EF4-FFF2-40B4-BE49-F238E27FC236}">
+                <a16:creationId xmlns:a16="http://schemas.microsoft.com/office/drawing/2014/main" id="{4AFABF0C-6511-FEFB-9AF5-325F0965863B}"/>
+              </a:ext>
+            </a:extLst>
+          </p:cNvPr>
+          <p:cNvSpPr>
+            <a:spLocks noChangeArrowheads="1"/>
+          </p:cNvSpPr>
+          <p:nvPr/>
+        </p:nvSpPr>
+        <p:spPr bwMode="auto">
+          <a:xfrm>
+            <a:off x="0" y="457200"/>
+            <a:ext cx="9144000" cy="15875"/>
+          </a:xfrm>
+          <a:prstGeom prst="rect">
+            <a:avLst/>
+          </a:prstGeom>
+          <a:solidFill>
+            <a:srgbClr val="000000"/>
+          </a:solidFill>
+          <a:ln w="9525">
+            <a:solidFill>
+              <a:schemeClr val="tx1"/>
+            </a:solidFill>
+            <a:prstDash val="solid"/>
+            <a:miter lim="800000"/>
+            <a:headEnd/>
+            <a:tailEnd/>
+          </a:ln>
+          <a:effectLst/>
+          <a:extLst>
+            <a:ext uri="{AF507438-7753-43E0-B8FC-AC1667EBCBE1}">
+              <a14:hiddenEffects xmlns:a14="http://schemas.microsoft.com/office/drawing/2010/main">
+                <a:effectLst>
+                  <a:outerShdw dist="35921" dir="2700000" algn="ctr" rotWithShape="0">
+                    <a:schemeClr val="bg2"/>
+                  </a:outerShdw>
+                </a:effectLst>
+              </a14:hiddenEffects>
+            </a:ext>
+          </a:extLst>
+        </p:spPr>
+        <p:txBody>
+          <a:bodyPr vert="horz" wrap="none" lIns="91440" tIns="45720" rIns="91440" bIns="45720" numCol="1" anchor="ctr" anchorCtr="0" compatLnSpc="1">
+            <a:prstTxWarp prst="textNoShape">
+              <a:avLst/>
+            </a:prstTxWarp>
+            <a:spAutoFit/>
+          </a:bodyPr>
+          <a:lstStyle/>
+          <a:p>
+            <a:endParaRPr lang="en-US"/>
+          </a:p>
+        </p:txBody>
+      </p:sp>
+      <p:sp>
+        <p:nvSpPr>
+          <p:cNvPr id="31" name="Rectangle 16">
+            <a:extLst>
+              <a:ext uri="{FF2B5EF4-FFF2-40B4-BE49-F238E27FC236}">
+                <a16:creationId xmlns:a16="http://schemas.microsoft.com/office/drawing/2014/main" id="{558A6F4B-2FC3-972F-71C6-503F8228C761}"/>
+              </a:ext>
+            </a:extLst>
+          </p:cNvPr>
+          <p:cNvSpPr>
+            <a:spLocks noGrp="1" noChangeArrowheads="1"/>
+          </p:cNvSpPr>
+          <p:nvPr>
+            <p:ph type="title"/>
+          </p:nvPr>
+        </p:nvSpPr>
+        <p:spPr bwMode="auto">
+          <a:xfrm rot="10800000" flipV="1">
+            <a:off x="5650989" y="1226176"/>
+            <a:ext cx="2984944" cy="2862322"/>
+          </a:xfrm>
+          <a:prstGeom prst="rect">
+            <a:avLst/>
+          </a:prstGeom>
+          <a:noFill/>
+          <a:ln>
+            <a:noFill/>
+          </a:ln>
+          <a:effectLst/>
+          <a:extLst>
+            <a:ext uri="{909E8E84-426E-40DD-AFC4-6F175D3DCCD1}">
+              <a14:hiddenFill xmlns:a14="http://schemas.microsoft.com/office/drawing/2010/main">
+                <a:solidFill>
+                  <a:schemeClr val="accent1"/>
+                </a:solidFill>
+              </a14:hiddenFill>
+            </a:ext>
+            <a:ext uri="{91240B29-F687-4F45-9708-019B960494DF}">
+              <a14:hiddenLine xmlns:a14="http://schemas.microsoft.com/office/drawing/2010/main" w="9525">
+                <a:solidFill>
+                  <a:schemeClr val="tx1"/>
+                </a:solidFill>
+                <a:miter lim="800000"/>
+                <a:headEnd/>
+                <a:tailEnd/>
+              </a14:hiddenLine>
+            </a:ext>
+            <a:ext uri="{AF507438-7753-43E0-B8FC-AC1667EBCBE1}">
+              <a14:hiddenEffects xmlns:a14="http://schemas.microsoft.com/office/drawing/2010/main">
+                <a:effectLst>
+                  <a:outerShdw dist="35921" dir="2700000" algn="ctr" rotWithShape="0">
+                    <a:schemeClr val="bg2"/>
+                  </a:outerShdw>
+                </a:effectLst>
+              </a14:hiddenEffects>
+            </a:ext>
+          </a:extLst>
+        </p:spPr>
+        <p:txBody>
+          <a:bodyPr vert="horz" wrap="square" lIns="91440" tIns="45720" rIns="91440" bIns="45720" numCol="1" anchor="ctr" anchorCtr="0" compatLnSpc="1">
+            <a:prstTxWarp prst="textNoShape">
+              <a:avLst/>
+            </a:prstTxWarp>
+            <a:spAutoFit/>
+          </a:bodyPr>
+          <a:lstStyle/>
+          <a:p>
+            <a:pPr marL="0" marR="0" lvl="0" indent="0" algn="l" defTabSz="914400" rtl="0" eaLnBrk="0" fontAlgn="base" latinLnBrk="0" hangingPunct="0">
+              <a:lnSpc>
+                <a:spcPct val="100000"/>
+              </a:lnSpc>
+              <a:spcBef>
+                <a:spcPct val="0"/>
+              </a:spcBef>
+              <a:spcAft>
+                <a:spcPct val="0"/>
+              </a:spcAft>
+              <a:buClrTx/>
+              <a:buSzTx/>
+              <a:buFontTx/>
+              <a:buNone/>
+              <a:tabLst/>
+            </a:pPr>
+            <a:endParaRPr kumimoji="0" lang="en-US" altLang="en-US" sz="1800" b="0" i="0" u="none" strike="noStrike" cap="none" normalizeH="0" baseline="0" dirty="0">
+              <a:ln>
+                <a:noFill/>
+              </a:ln>
+              <a:solidFill>
+                <a:schemeClr val="tx1"/>
+              </a:solidFill>
+              <a:effectLst/>
+              <a:latin typeface="Arial" panose="020B0604020202020204" pitchFamily="34" charset="0"/>
+            </a:endParaRPr>
+          </a:p>
+          <a:p>
+            <a:pPr marL="0" marR="0" lvl="0" indent="0" algn="l" defTabSz="914400" rtl="0" eaLnBrk="0" fontAlgn="base" latinLnBrk="0" hangingPunct="0">
+              <a:lnSpc>
+                <a:spcPct val="100000"/>
+              </a:lnSpc>
+              <a:spcBef>
+                <a:spcPct val="0"/>
+              </a:spcBef>
+              <a:spcAft>
+                <a:spcPct val="0"/>
+              </a:spcAft>
+              <a:buClrTx/>
+              <a:buSzTx/>
+              <a:buFontTx/>
+              <a:buChar char="•"/>
+              <a:tabLst/>
+            </a:pPr>
+            <a:r>
+              <a:rPr kumimoji="0" lang="en-US" altLang="en-US" sz="1800" b="0" i="0" u="none" strike="noStrike" cap="none" normalizeH="0" baseline="0" dirty="0">
+                <a:ln>
+                  <a:noFill/>
+                </a:ln>
+                <a:solidFill>
+                  <a:schemeClr val="tx1"/>
+                </a:solidFill>
+                <a:effectLst/>
+                <a:latin typeface="Arial" panose="020B0604020202020204" pitchFamily="34" charset="0"/>
+              </a:rPr>
+              <a:t>Most EVs cluster at affordable price ranges with moderate range</a:t>
+            </a:r>
+          </a:p>
+          <a:p>
+            <a:pPr marL="0" marR="0" lvl="0" indent="0" algn="l" defTabSz="914400" rtl="0" eaLnBrk="0" fontAlgn="base" latinLnBrk="0" hangingPunct="0">
+              <a:lnSpc>
+                <a:spcPct val="100000"/>
+              </a:lnSpc>
+              <a:spcBef>
+                <a:spcPct val="0"/>
+              </a:spcBef>
+              <a:spcAft>
+                <a:spcPct val="0"/>
+              </a:spcAft>
+              <a:buClrTx/>
+              <a:buSzTx/>
+              <a:buFontTx/>
+              <a:buChar char="•"/>
+              <a:tabLst/>
+            </a:pPr>
+            <a:r>
+              <a:rPr kumimoji="0" lang="en-US" altLang="en-US" sz="1800" b="0" i="0" u="none" strike="noStrike" cap="none" normalizeH="0" baseline="0" dirty="0">
+                <a:ln>
+                  <a:noFill/>
+                </a:ln>
+                <a:solidFill>
+                  <a:schemeClr val="tx1"/>
+                </a:solidFill>
+                <a:effectLst/>
+                <a:latin typeface="Arial" panose="020B0604020202020204" pitchFamily="34" charset="0"/>
+              </a:rPr>
+              <a:t>High-range vehicles often come with higher MSRP</a:t>
+            </a:r>
+          </a:p>
+          <a:p>
+            <a:pPr marL="0" marR="0" lvl="0" indent="0" algn="l" defTabSz="914400" rtl="0" eaLnBrk="0" fontAlgn="base" latinLnBrk="0" hangingPunct="0">
+              <a:lnSpc>
+                <a:spcPct val="100000"/>
+              </a:lnSpc>
+              <a:spcBef>
+                <a:spcPct val="0"/>
+              </a:spcBef>
+              <a:spcAft>
+                <a:spcPct val="0"/>
+              </a:spcAft>
+              <a:buClrTx/>
+              <a:buSzTx/>
+              <a:buFontTx/>
+              <a:buChar char="•"/>
+              <a:tabLst/>
+            </a:pPr>
+            <a:r>
+              <a:rPr kumimoji="0" lang="en-US" altLang="en-US" sz="1800" b="0" i="0" u="none" strike="noStrike" cap="none" normalizeH="0" baseline="0" dirty="0">
+                <a:ln>
+                  <a:noFill/>
+                </a:ln>
+                <a:solidFill>
+                  <a:schemeClr val="tx1"/>
+                </a:solidFill>
+                <a:effectLst/>
+                <a:latin typeface="Arial" panose="020B0604020202020204" pitchFamily="34" charset="0"/>
+              </a:rPr>
+              <a:t>Shows expected positive correlation between price and performance</a:t>
+            </a:r>
+          </a:p>
+          <a:p>
+            <a:pPr marL="0" marR="0" lvl="0" indent="0" algn="l" defTabSz="914400" rtl="0" eaLnBrk="0" fontAlgn="base" latinLnBrk="0" hangingPunct="0">
+              <a:lnSpc>
+                <a:spcPct val="100000"/>
+              </a:lnSpc>
+              <a:spcBef>
+                <a:spcPct val="0"/>
+              </a:spcBef>
+              <a:spcAft>
+                <a:spcPct val="0"/>
+              </a:spcAft>
+              <a:buClrTx/>
+              <a:buSzTx/>
+              <a:buFontTx/>
+              <a:buNone/>
+              <a:tabLst/>
+            </a:pPr>
+            <a:endParaRPr kumimoji="0" lang="en-US" altLang="en-US" sz="1800" b="0" i="0" u="none" strike="noStrike" cap="none" normalizeH="0" baseline="0" dirty="0">
+              <a:ln>
+                <a:noFill/>
+              </a:ln>
+              <a:solidFill>
+                <a:schemeClr val="tx1"/>
+              </a:solidFill>
+              <a:effectLst/>
+              <a:latin typeface="Arial" panose="020B0604020202020204" pitchFamily="34" charset="0"/>
+            </a:endParaRPr>
+          </a:p>
+        </p:txBody>
+      </p:sp>
     </p:spTree>
+  </p:cSld>
+  <p:clrMapOvr>
+    <a:masterClrMapping/>
+  </p:clrMapOvr>
+</p:sld>
+</file>
+
+<file path=ppt/slides/slide7.xml><?xml version="1.0" encoding="utf-8"?>
+<p:sld xmlns:a="http://schemas.openxmlformats.org/drawingml/2006/main" xmlns:r="http://schemas.openxmlformats.org/officeDocument/2006/relationships" xmlns:p="http://schemas.openxmlformats.org/presentationml/2006/main">
+  <p:cSld>
+    <p:bg>
+      <p:bgPr>
+        <a:solidFill>
+          <a:schemeClr val="bg1"/>
+        </a:solidFill>
+        <a:effectLst/>
+      </p:bgPr>
+    </p:bg>
+    <p:spTree>
+      <p:nvGrpSpPr>
+        <p:cNvPr id="1" name=""/>
+        <p:cNvGrpSpPr/>
+        <p:nvPr/>
+      </p:nvGrpSpPr>
+      <p:grpSpPr>
+        <a:xfrm>
+          <a:off x="0" y="0"/>
+          <a:ext cx="0" cy="0"/>
+          <a:chOff x="0" y="0"/>
+          <a:chExt cx="0" cy="0"/>
+        </a:xfrm>
+      </p:grpSpPr>
+      <p:sp useBgFill="1">
+        <p:nvSpPr>
+          <p:cNvPr id="8" name="Rectangle 7">
+            <a:extLst>
+              <a:ext uri="{FF2B5EF4-FFF2-40B4-BE49-F238E27FC236}">
+                <a16:creationId xmlns:a16="http://schemas.microsoft.com/office/drawing/2014/main" id="{3AD318CC-E2A8-4E27-9548-A047A78999B1}"/>
+              </a:ext>
+              <a:ext uri="{C183D7F6-B498-43B3-948B-1728B52AA6E4}">
+                <adec:decorative xmlns:adec="http://schemas.microsoft.com/office/drawing/2017/decorative" val="1"/>
+              </a:ext>
+            </a:extLst>
+          </p:cNvPr>
+          <p:cNvSpPr>
+            <a:spLocks noGrp="1" noRot="1" noChangeAspect="1" noMove="1" noResize="1" noEditPoints="1" noAdjustHandles="1" noChangeArrowheads="1" noChangeShapeType="1" noTextEdit="1"/>
+          </p:cNvSpPr>
+          <p:nvPr>
+            <p:extLst>
+              <p:ext uri="{386F3935-93C4-4BCD-93E2-E3B085C9AB24}">
+                <p16:designElem xmlns:p16="http://schemas.microsoft.com/office/powerpoint/2015/main" val="1"/>
+              </p:ext>
+            </p:extLst>
+          </p:nvPr>
+        </p:nvSpPr>
+        <p:spPr>
+          <a:xfrm>
+            <a:off x="0" y="0"/>
+            <a:ext cx="9143999" cy="6857365"/>
+          </a:xfrm>
+          <a:prstGeom prst="rect">
+            <a:avLst/>
+          </a:prstGeom>
+          <a:ln>
+            <a:noFill/>
+          </a:ln>
+        </p:spPr>
+        <p:style>
+          <a:lnRef idx="2">
+            <a:schemeClr val="accent1">
+              <a:shade val="50000"/>
+            </a:schemeClr>
+          </a:lnRef>
+          <a:fillRef idx="1">
+            <a:schemeClr val="accent1"/>
+          </a:fillRef>
+          <a:effectRef idx="0">
+            <a:schemeClr val="accent1"/>
+          </a:effectRef>
+          <a:fontRef idx="minor">
+            <a:schemeClr val="lt1"/>
+          </a:fontRef>
+        </p:style>
+        <p:txBody>
+          <a:bodyPr rtlCol="0" anchor="ctr"/>
+          <a:lstStyle/>
+          <a:p>
+            <a:pPr algn="ctr"/>
+            <a:endParaRPr lang="en-US"/>
+          </a:p>
+        </p:txBody>
+      </p:sp>
+      <p:sp>
+        <p:nvSpPr>
+          <p:cNvPr id="2" name="Title 1">
+            <a:extLst>
+              <a:ext uri="{FF2B5EF4-FFF2-40B4-BE49-F238E27FC236}">
+                <a16:creationId xmlns:a16="http://schemas.microsoft.com/office/drawing/2014/main" id="{1A2AEDBF-857F-C4A9-E196-AE5D8E79E80C}"/>
+              </a:ext>
+            </a:extLst>
+          </p:cNvPr>
+          <p:cNvSpPr>
+            <a:spLocks noGrp="1"/>
+          </p:cNvSpPr>
+          <p:nvPr>
+            <p:ph type="title"/>
+          </p:nvPr>
+        </p:nvSpPr>
+        <p:spPr>
+          <a:xfrm>
+            <a:off x="483798" y="1463040"/>
+            <a:ext cx="2847230" cy="2690949"/>
+          </a:xfrm>
+        </p:spPr>
+        <p:txBody>
+          <a:bodyPr vert="horz" lIns="91440" tIns="45720" rIns="91440" bIns="45720" rtlCol="0" anchor="t">
+            <a:normAutofit/>
+          </a:bodyPr>
+          <a:lstStyle/>
+          <a:p>
+            <a:pPr algn="l" defTabSz="914400">
+              <a:lnSpc>
+                <a:spcPct val="90000"/>
+              </a:lnSpc>
+            </a:pPr>
+            <a:r>
+              <a:rPr lang="en-US" altLang="en-US" sz="4200" b="1" kern="1200">
+                <a:solidFill>
+                  <a:schemeClr val="tx1"/>
+                </a:solidFill>
+                <a:latin typeface="+mj-lt"/>
+                <a:ea typeface="+mj-ea"/>
+                <a:cs typeface="+mj-cs"/>
+              </a:rPr>
+              <a:t>Conclusion</a:t>
+            </a:r>
+            <a:br>
+              <a:rPr lang="en-US" altLang="en-US" sz="4200" kern="1200">
+                <a:solidFill>
+                  <a:schemeClr val="tx1"/>
+                </a:solidFill>
+                <a:latin typeface="+mj-lt"/>
+                <a:ea typeface="+mj-ea"/>
+                <a:cs typeface="+mj-cs"/>
+              </a:rPr>
+            </a:br>
+            <a:endParaRPr lang="en-US" sz="4200" kern="1200">
+              <a:solidFill>
+                <a:schemeClr val="tx1"/>
+              </a:solidFill>
+              <a:latin typeface="+mj-lt"/>
+              <a:ea typeface="+mj-ea"/>
+              <a:cs typeface="+mj-cs"/>
+            </a:endParaRPr>
+          </a:p>
+        </p:txBody>
+      </p:sp>
+      <p:grpSp>
+        <p:nvGrpSpPr>
+          <p:cNvPr id="10" name="Group 9">
+            <a:extLst>
+              <a:ext uri="{FF2B5EF4-FFF2-40B4-BE49-F238E27FC236}">
+                <a16:creationId xmlns:a16="http://schemas.microsoft.com/office/drawing/2014/main" id="{B14B560F-9DD7-4302-A60B-EBD3EF59B073}"/>
+              </a:ext>
+              <a:ext uri="{C183D7F6-B498-43B3-948B-1728B52AA6E4}">
+                <adec:decorative xmlns:adec="http://schemas.microsoft.com/office/drawing/2017/decorative" val="1"/>
+              </a:ext>
+            </a:extLst>
+          </p:cNvPr>
+          <p:cNvGrpSpPr>
+            <a:grpSpLocks noGrp="1" noUngrp="1" noRot="1" noChangeAspect="1" noMove="1" noResize="1"/>
+          </p:cNvGrpSpPr>
+          <p:nvPr>
+            <p:extLst>
+              <p:ext uri="{386F3935-93C4-4BCD-93E2-E3B085C9AB24}">
+                <p16:designElem xmlns:p16="http://schemas.microsoft.com/office/powerpoint/2015/main" val="1"/>
+              </p:ext>
+            </p:extLst>
+          </p:nvPr>
+        </p:nvGrpSpPr>
+        <p:grpSpPr>
+          <a:xfrm>
+            <a:off x="157250" y="4415246"/>
+            <a:ext cx="8986749" cy="2087795"/>
+            <a:chOff x="143163" y="5763486"/>
+            <a:chExt cx="11982332" cy="739555"/>
+          </a:xfrm>
+        </p:grpSpPr>
+        <p:sp>
+          <p:nvSpPr>
+            <p:cNvPr id="11" name="Rectangle 10">
+              <a:extLst>
+                <a:ext uri="{FF2B5EF4-FFF2-40B4-BE49-F238E27FC236}">
+                  <a16:creationId xmlns:a16="http://schemas.microsoft.com/office/drawing/2014/main" id="{3A9A4357-BD1D-4622-A4FE-766E6AB8DE84}"/>
+                </a:ext>
+                <a:ext uri="{C183D7F6-B498-43B3-948B-1728B52AA6E4}">
+                  <adec:decorative xmlns:adec="http://schemas.microsoft.com/office/drawing/2017/decorative" val="1"/>
+                </a:ext>
+              </a:extLst>
+            </p:cNvPr>
+            <p:cNvSpPr/>
+            <p:nvPr>
+              <p:extLst>
+                <p:ext uri="{386F3935-93C4-4BCD-93E2-E3B085C9AB24}">
+                  <p16:designElem xmlns:p16="http://schemas.microsoft.com/office/powerpoint/2015/main" val="1"/>
+                </p:ext>
+              </p:extLst>
+            </p:nvPr>
+          </p:nvSpPr>
+          <p:spPr>
+            <a:xfrm flipH="1" flipV="1">
+              <a:off x="357444" y="5763486"/>
+              <a:ext cx="11768051" cy="739555"/>
+            </a:xfrm>
+            <a:prstGeom prst="rect">
+              <a:avLst/>
+            </a:prstGeom>
+            <a:solidFill>
+              <a:schemeClr val="accent4"/>
+            </a:solidFill>
+            <a:ln>
+              <a:noFill/>
+            </a:ln>
+          </p:spPr>
+          <p:style>
+            <a:lnRef idx="2">
+              <a:schemeClr val="accent1">
+                <a:shade val="50000"/>
+              </a:schemeClr>
+            </a:lnRef>
+            <a:fillRef idx="1">
+              <a:schemeClr val="accent1"/>
+            </a:fillRef>
+            <a:effectRef idx="0">
+              <a:schemeClr val="accent1"/>
+            </a:effectRef>
+            <a:fontRef idx="minor">
+              <a:schemeClr val="lt1"/>
+            </a:fontRef>
+          </p:style>
+          <p:txBody>
+            <a:bodyPr rtlCol="0" anchor="ctr"/>
+            <a:lstStyle/>
+            <a:p>
+              <a:pPr algn="ctr"/>
+              <a:endParaRPr lang="en-US"/>
+            </a:p>
+          </p:txBody>
+        </p:sp>
+        <p:cxnSp>
+          <p:nvCxnSpPr>
+            <p:cNvPr id="12" name="Straight Connector 11">
+              <a:extLst>
+                <a:ext uri="{FF2B5EF4-FFF2-40B4-BE49-F238E27FC236}">
+                  <a16:creationId xmlns:a16="http://schemas.microsoft.com/office/drawing/2014/main" id="{C21D6966-343E-49AC-A026-D2497E0C3CA1}"/>
+                </a:ext>
+                <a:ext uri="{C183D7F6-B498-43B3-948B-1728B52AA6E4}">
+                  <adec:decorative xmlns:adec="http://schemas.microsoft.com/office/drawing/2017/decorative" val="1"/>
+                </a:ext>
+              </a:extLst>
+            </p:cNvPr>
+            <p:cNvCxnSpPr>
+              <a:cxnSpLocks/>
+            </p:cNvCxnSpPr>
+            <p:nvPr>
+              <p:extLst>
+                <p:ext uri="{386F3935-93C4-4BCD-93E2-E3B085C9AB24}">
+                  <p16:designElem xmlns:p16="http://schemas.microsoft.com/office/powerpoint/2015/main" val="1"/>
+                </p:ext>
+              </p:extLst>
+            </p:nvPr>
+          </p:nvCxnSpPr>
+          <p:spPr>
+            <a:xfrm flipH="1">
+              <a:off x="143163" y="5763486"/>
+              <a:ext cx="1" cy="739555"/>
+            </a:xfrm>
+            <a:prstGeom prst="line">
+              <a:avLst/>
+            </a:prstGeom>
+            <a:ln w="177800">
+              <a:solidFill>
+                <a:schemeClr val="accent4"/>
+              </a:solidFill>
+            </a:ln>
+          </p:spPr>
+          <p:style>
+            <a:lnRef idx="1">
+              <a:schemeClr val="accent1"/>
+            </a:lnRef>
+            <a:fillRef idx="0">
+              <a:schemeClr val="accent1"/>
+            </a:fillRef>
+            <a:effectRef idx="0">
+              <a:schemeClr val="accent1"/>
+            </a:effectRef>
+            <a:fontRef idx="minor">
+              <a:schemeClr val="tx1"/>
+            </a:fontRef>
+          </p:style>
+        </p:cxnSp>
+      </p:grpSp>
+      <p:sp>
+        <p:nvSpPr>
+          <p:cNvPr id="14" name="Rectangle 13">
+            <a:extLst>
+              <a:ext uri="{FF2B5EF4-FFF2-40B4-BE49-F238E27FC236}">
+                <a16:creationId xmlns:a16="http://schemas.microsoft.com/office/drawing/2014/main" id="{2C1BBA94-3F40-40AA-8BB9-E69E25E537C1}"/>
+              </a:ext>
+              <a:ext uri="{C183D7F6-B498-43B3-948B-1728B52AA6E4}">
+                <adec:decorative xmlns:adec="http://schemas.microsoft.com/office/drawing/2017/decorative" val="1"/>
+              </a:ext>
+            </a:extLst>
+          </p:cNvPr>
+          <p:cNvSpPr>
+            <a:spLocks noGrp="1" noRot="1" noChangeAspect="1" noMove="1" noResize="1" noEditPoints="1" noAdjustHandles="1" noChangeArrowheads="1" noChangeShapeType="1" noTextEdit="1"/>
+          </p:cNvSpPr>
+          <p:nvPr>
+            <p:extLst>
+              <p:ext uri="{386F3935-93C4-4BCD-93E2-E3B085C9AB24}">
+                <p16:designElem xmlns:p16="http://schemas.microsoft.com/office/powerpoint/2015/main" val="1"/>
+              </p:ext>
+            </p:extLst>
+          </p:nvPr>
+        </p:nvSpPr>
+        <p:spPr>
+          <a:xfrm>
+            <a:off x="3850279" y="587829"/>
+            <a:ext cx="4878975" cy="5682342"/>
+          </a:xfrm>
+          <a:prstGeom prst="rect">
+            <a:avLst/>
+          </a:prstGeom>
+          <a:solidFill>
+            <a:schemeClr val="bg1"/>
+          </a:solidFill>
+          <a:ln>
+            <a:noFill/>
+          </a:ln>
+          <a:effectLst>
+            <a:outerShdw blurRad="139700" dist="127000" dir="5400000" algn="t" rotWithShape="0">
+              <a:prstClr val="black">
+                <a:alpha val="15000"/>
+              </a:prstClr>
+            </a:outerShdw>
+          </a:effectLst>
+        </p:spPr>
+        <p:style>
+          <a:lnRef idx="2">
+            <a:schemeClr val="accent1">
+              <a:shade val="50000"/>
+            </a:schemeClr>
+          </a:lnRef>
+          <a:fillRef idx="1">
+            <a:schemeClr val="accent1"/>
+          </a:fillRef>
+          <a:effectRef idx="0">
+            <a:schemeClr val="accent1"/>
+          </a:effectRef>
+          <a:fontRef idx="minor">
+            <a:schemeClr val="lt1"/>
+          </a:fontRef>
+        </p:style>
+        <p:txBody>
+          <a:bodyPr rtlCol="0" anchor="ctr"/>
+          <a:lstStyle/>
+          <a:p>
+            <a:pPr algn="ctr"/>
+            <a:endParaRPr lang="en-US"/>
+          </a:p>
+        </p:txBody>
+      </p:sp>
+      <p:sp>
+        <p:nvSpPr>
+          <p:cNvPr id="3" name="Rectangle 1">
+            <a:extLst>
+              <a:ext uri="{FF2B5EF4-FFF2-40B4-BE49-F238E27FC236}">
+                <a16:creationId xmlns:a16="http://schemas.microsoft.com/office/drawing/2014/main" id="{0EC4AFFC-A0C8-DC81-DAD0-82976F1BF8E1}"/>
+              </a:ext>
+            </a:extLst>
+          </p:cNvPr>
+          <p:cNvSpPr>
+            <a:spLocks noChangeArrowheads="1"/>
+          </p:cNvSpPr>
+          <p:nvPr/>
+        </p:nvSpPr>
+        <p:spPr bwMode="auto">
+          <a:xfrm>
+            <a:off x="4242163" y="1463039"/>
+            <a:ext cx="4156790" cy="4300447"/>
+          </a:xfrm>
+          <a:prstGeom prst="rect">
+            <a:avLst/>
+          </a:prstGeom>
+          <a:extLst>
+            <a:ext uri="{909E8E84-426E-40DD-AFC4-6F175D3DCCD1}">
+              <a14:hiddenFill xmlns:a14="http://schemas.microsoft.com/office/drawing/2010/main">
+                <a:solidFill>
+                  <a:schemeClr val="accent1"/>
+                </a:solidFill>
+              </a14:hiddenFill>
+            </a:ext>
+            <a:ext uri="{91240B29-F687-4F45-9708-019B960494DF}">
+              <a14:hiddenLine xmlns:a14="http://schemas.microsoft.com/office/drawing/2010/main" w="9525">
+                <a:solidFill>
+                  <a:schemeClr val="tx1"/>
+                </a:solidFill>
+                <a:miter lim="800000"/>
+                <a:headEnd/>
+                <a:tailEnd/>
+              </a14:hiddenLine>
+            </a:ext>
+            <a:ext uri="{AF507438-7753-43E0-B8FC-AC1667EBCBE1}">
+              <a14:hiddenEffects xmlns:a14="http://schemas.microsoft.com/office/drawing/2010/main">
+                <a:effectLst>
+                  <a:outerShdw dist="35921" dir="2700000" algn="ctr" rotWithShape="0">
+                    <a:schemeClr val="bg2"/>
+                  </a:outerShdw>
+                </a:effectLst>
+              </a14:hiddenEffects>
+            </a:ext>
+          </a:extLst>
+        </p:spPr>
+        <p:txBody>
+          <a:bodyPr vert="horz" lIns="91440" tIns="45720" rIns="91440" bIns="45720" numCol="1" rtlCol="0" anchor="t" anchorCtr="0" compatLnSpc="1">
+            <a:prstTxWarp prst="textNoShape">
+              <a:avLst/>
+            </a:prstTxWarp>
+            <a:normAutofit/>
+          </a:bodyPr>
+          <a:lstStyle/>
+          <a:p>
+            <a:pPr marL="0" marR="0" lvl="0" indent="-228600" defTabSz="914400" fontAlgn="base">
+              <a:lnSpc>
+                <a:spcPct val="90000"/>
+              </a:lnSpc>
+              <a:spcBef>
+                <a:spcPct val="0"/>
+              </a:spcBef>
+              <a:spcAft>
+                <a:spcPts val="600"/>
+              </a:spcAft>
+              <a:buClrTx/>
+              <a:buSzTx/>
+              <a:buFont typeface="Arial" panose="020B0604020202020204" pitchFamily="34" charset="0"/>
+              <a:buChar char="•"/>
+              <a:tabLst/>
+            </a:pPr>
+            <a:r>
+              <a:rPr kumimoji="0" lang="en-US" altLang="en-US" sz="1900" b="0" i="0" u="none" strike="noStrike" cap="none" normalizeH="0" baseline="0" dirty="0">
+                <a:ln>
+                  <a:noFill/>
+                </a:ln>
+                <a:effectLst/>
+              </a:rPr>
+              <a:t>EV adoption is accelerating rapidly after 2015</a:t>
+            </a:r>
+          </a:p>
+          <a:p>
+            <a:pPr marL="0" marR="0" lvl="0" indent="-228600" defTabSz="914400" fontAlgn="base">
+              <a:lnSpc>
+                <a:spcPct val="90000"/>
+              </a:lnSpc>
+              <a:spcBef>
+                <a:spcPct val="0"/>
+              </a:spcBef>
+              <a:spcAft>
+                <a:spcPts val="600"/>
+              </a:spcAft>
+              <a:buClrTx/>
+              <a:buSzTx/>
+              <a:buFont typeface="Arial" panose="020B0604020202020204" pitchFamily="34" charset="0"/>
+              <a:buChar char="•"/>
+              <a:tabLst/>
+            </a:pPr>
+            <a:r>
+              <a:rPr kumimoji="0" lang="en-US" altLang="en-US" sz="1900" b="0" i="0" u="none" strike="noStrike" cap="none" normalizeH="0" baseline="0" dirty="0">
+                <a:ln>
+                  <a:noFill/>
+                </a:ln>
+                <a:effectLst/>
+              </a:rPr>
+              <a:t>Tesla is the clear market leader</a:t>
+            </a:r>
+          </a:p>
+          <a:p>
+            <a:pPr marL="0" marR="0" lvl="0" indent="-228600" defTabSz="914400" fontAlgn="base">
+              <a:lnSpc>
+                <a:spcPct val="90000"/>
+              </a:lnSpc>
+              <a:spcBef>
+                <a:spcPct val="0"/>
+              </a:spcBef>
+              <a:spcAft>
+                <a:spcPts val="600"/>
+              </a:spcAft>
+              <a:buClrTx/>
+              <a:buSzTx/>
+              <a:buFont typeface="Arial" panose="020B0604020202020204" pitchFamily="34" charset="0"/>
+              <a:buChar char="•"/>
+              <a:tabLst/>
+            </a:pPr>
+            <a:r>
+              <a:rPr kumimoji="0" lang="en-US" altLang="en-US" sz="1900" b="0" i="0" u="none" strike="noStrike" cap="none" normalizeH="0" baseline="0" dirty="0">
+                <a:ln>
+                  <a:noFill/>
+                </a:ln>
+                <a:effectLst/>
+              </a:rPr>
+              <a:t>BEVs dominate over PHEVs</a:t>
+            </a:r>
+          </a:p>
+          <a:p>
+            <a:pPr marL="0" marR="0" lvl="0" indent="-228600" defTabSz="914400" fontAlgn="base">
+              <a:lnSpc>
+                <a:spcPct val="90000"/>
+              </a:lnSpc>
+              <a:spcBef>
+                <a:spcPct val="0"/>
+              </a:spcBef>
+              <a:spcAft>
+                <a:spcPts val="600"/>
+              </a:spcAft>
+              <a:buClrTx/>
+              <a:buSzTx/>
+              <a:buFont typeface="Arial" panose="020B0604020202020204" pitchFamily="34" charset="0"/>
+              <a:buChar char="•"/>
+              <a:tabLst/>
+            </a:pPr>
+            <a:r>
+              <a:rPr kumimoji="0" lang="en-US" altLang="en-US" sz="1900" b="0" i="0" u="none" strike="noStrike" cap="none" normalizeH="0" baseline="0" dirty="0">
+                <a:ln>
+                  <a:noFill/>
+                </a:ln>
+                <a:effectLst/>
+              </a:rPr>
+              <a:t>Price tends to increase with higher range</a:t>
+            </a:r>
+          </a:p>
+          <a:p>
+            <a:pPr marL="0" marR="0" lvl="0" indent="-228600" defTabSz="914400" fontAlgn="base">
+              <a:lnSpc>
+                <a:spcPct val="90000"/>
+              </a:lnSpc>
+              <a:spcBef>
+                <a:spcPct val="0"/>
+              </a:spcBef>
+              <a:spcAft>
+                <a:spcPts val="600"/>
+              </a:spcAft>
+              <a:buClrTx/>
+              <a:buSzTx/>
+              <a:buFont typeface="Arial" panose="020B0604020202020204" pitchFamily="34" charset="0"/>
+              <a:buChar char="•"/>
+              <a:tabLst/>
+            </a:pPr>
+            <a:r>
+              <a:rPr kumimoji="0" lang="en-US" altLang="en-US" sz="1900" b="0" i="0" u="none" strike="noStrike" cap="none" normalizeH="0" baseline="0" dirty="0">
+                <a:ln>
+                  <a:noFill/>
+                </a:ln>
+                <a:effectLst/>
+              </a:rPr>
+              <a:t>Demonstrated workflow: cleaning → analysis → visualization → automated reporting</a:t>
+            </a:r>
+          </a:p>
+          <a:p>
+            <a:pPr marL="0" marR="0" lvl="0" indent="-228600" defTabSz="914400" fontAlgn="base">
+              <a:lnSpc>
+                <a:spcPct val="90000"/>
+              </a:lnSpc>
+              <a:spcBef>
+                <a:spcPct val="0"/>
+              </a:spcBef>
+              <a:spcAft>
+                <a:spcPts val="600"/>
+              </a:spcAft>
+              <a:buClrTx/>
+              <a:buSzTx/>
+              <a:buFont typeface="Arial" panose="020B0604020202020204" pitchFamily="34" charset="0"/>
+              <a:buChar char="•"/>
+              <a:tabLst/>
+            </a:pPr>
+            <a:endParaRPr kumimoji="0" lang="en-US" altLang="en-US" sz="1900" b="0" i="0" u="none" strike="noStrike" cap="none" normalizeH="0" baseline="0" dirty="0">
+              <a:ln>
+                <a:noFill/>
+              </a:ln>
+              <a:effectLst/>
+            </a:endParaRPr>
+          </a:p>
+        </p:txBody>
+      </p:sp>
+    </p:spTree>
+    <p:extLst>
+      <p:ext uri="{BB962C8B-B14F-4D97-AF65-F5344CB8AC3E}">
+        <p14:creationId xmlns:p14="http://schemas.microsoft.com/office/powerpoint/2010/main" val="254760646"/>
+      </p:ext>
+    </p:extLst>
   </p:cSld>
   <p:clrMapOvr>
     <a:masterClrMapping/>

</xml_diff>